<commit_message>
Updated proposal + architecture
</commit_message>
<xml_diff>
--- a/Documentation/Spotify Classifier Proposal.pptx
+++ b/Documentation/Spotify Classifier Proposal.pptx
@@ -5,7 +5,7 @@
     <p:sldMasterId id="2147483660" r:id="rId1"/>
   </p:sldMasterIdLst>
   <p:notesMasterIdLst>
-    <p:notesMasterId r:id="rId8"/>
+    <p:notesMasterId r:id="rId9"/>
   </p:notesMasterIdLst>
   <p:sldIdLst>
     <p:sldId id="256" r:id="rId2"/>
@@ -14,6 +14,7 @@
     <p:sldId id="259" r:id="rId5"/>
     <p:sldId id="260" r:id="rId6"/>
     <p:sldId id="261" r:id="rId7"/>
+    <p:sldId id="262" r:id="rId8"/>
   </p:sldIdLst>
   <p:sldSz cx="9144000" cy="5143500" type="screen16x9"/>
   <p:notesSz cx="6858000" cy="9144000"/>
@@ -1722,7 +1723,7 @@
       </p:grpSpPr>
       <p:sp>
         <p:nvSpPr>
-          <p:cNvPr id="82" name="Google Shape;82;gf861cc4a69_0_14:notes"/>
+          <p:cNvPr id="82" name="Google Shape;82;g1005ce2cacc_0_0:notes"/>
           <p:cNvSpPr txBox="1">
             <a:spLocks noGrp="1"/>
           </p:cNvSpPr>
@@ -1788,7 +1789,7 @@
       </p:sp>
       <p:sp>
         <p:nvSpPr>
-          <p:cNvPr id="83" name="Google Shape;83;gf861cc4a69_0_14:notes"/>
+          <p:cNvPr id="83" name="Google Shape;83;g1005ce2cacc_0_0:notes"/>
           <p:cNvSpPr>
             <a:spLocks noGrp="1" noRot="1" noChangeAspect="1"/>
           </p:cNvSpPr>
@@ -1840,7 +1841,7 @@
   <p:cSld>
     <p:spTree>
       <p:nvGrpSpPr>
-        <p:cNvPr id="1" name="Shape 91"/>
+        <p:cNvPr id="1" name="Shape 92"/>
         <p:cNvGrpSpPr/>
         <p:nvPr/>
       </p:nvGrpSpPr>
@@ -1854,7 +1855,7 @@
       </p:grpSpPr>
       <p:sp>
         <p:nvSpPr>
-          <p:cNvPr id="92" name="Google Shape;92;gf861cc4a69_0_4:notes"/>
+          <p:cNvPr id="93" name="Google Shape;93;gf861cc4a69_0_14:notes"/>
           <p:cNvSpPr txBox="1">
             <a:spLocks noGrp="1"/>
           </p:cNvSpPr>
@@ -1920,7 +1921,7 @@
       </p:sp>
       <p:sp>
         <p:nvSpPr>
-          <p:cNvPr id="93" name="Google Shape;93;gf861cc4a69_0_4:notes"/>
+          <p:cNvPr id="94" name="Google Shape;94;gf861cc4a69_0_14:notes"/>
           <p:cNvSpPr>
             <a:spLocks noGrp="1" noRot="1" noChangeAspect="1"/>
           </p:cNvSpPr>
@@ -1972,7 +1973,7 @@
   <p:cSld>
     <p:spTree>
       <p:nvGrpSpPr>
-        <p:cNvPr id="1" name="Shape 104"/>
+        <p:cNvPr id="1" name="Shape 102"/>
         <p:cNvGrpSpPr/>
         <p:nvPr/>
       </p:nvGrpSpPr>
@@ -1986,7 +1987,7 @@
       </p:grpSpPr>
       <p:sp>
         <p:nvSpPr>
-          <p:cNvPr id="105" name="Google Shape;105;gf861cc4a69_0_24:notes"/>
+          <p:cNvPr id="103" name="Google Shape;103;gf861cc4a69_0_4:notes"/>
           <p:cNvSpPr txBox="1">
             <a:spLocks noGrp="1"/>
           </p:cNvSpPr>
@@ -2052,7 +2053,7 @@
       </p:sp>
       <p:sp>
         <p:nvSpPr>
-          <p:cNvPr id="106" name="Google Shape;106;gf861cc4a69_0_24:notes"/>
+          <p:cNvPr id="104" name="Google Shape;104;gf861cc4a69_0_4:notes"/>
           <p:cNvSpPr>
             <a:spLocks noGrp="1" noRot="1" noChangeAspect="1"/>
           </p:cNvSpPr>
@@ -2118,7 +2119,7 @@
       </p:grpSpPr>
       <p:sp>
         <p:nvSpPr>
-          <p:cNvPr id="116" name="Google Shape;116;gf861cc4a69_0_36:notes"/>
+          <p:cNvPr id="116" name="Google Shape;116;gf861cc4a69_0_24:notes"/>
           <p:cNvSpPr txBox="1">
             <a:spLocks noGrp="1"/>
           </p:cNvSpPr>
@@ -2184,7 +2185,139 @@
       </p:sp>
       <p:sp>
         <p:nvSpPr>
-          <p:cNvPr id="117" name="Google Shape;117;gf861cc4a69_0_36:notes"/>
+          <p:cNvPr id="117" name="Google Shape;117;gf861cc4a69_0_24:notes"/>
+          <p:cNvSpPr>
+            <a:spLocks noGrp="1" noRot="1" noChangeAspect="1"/>
+          </p:cNvSpPr>
+          <p:nvPr>
+            <p:ph type="sldImg" idx="2"/>
+          </p:nvPr>
+        </p:nvSpPr>
+        <p:spPr>
+          <a:xfrm>
+            <a:off x="685800" y="1143000"/>
+            <a:ext cx="5486400" cy="3086100"/>
+          </a:xfrm>
+          <a:custGeom>
+            <a:avLst/>
+            <a:gdLst/>
+            <a:ahLst/>
+            <a:cxnLst/>
+            <a:rect l="l" t="t" r="r" b="b"/>
+            <a:pathLst>
+              <a:path w="120000" h="120000" extrusionOk="0">
+                <a:moveTo>
+                  <a:pt x="0" y="0"/>
+                </a:moveTo>
+                <a:lnTo>
+                  <a:pt x="120000" y="0"/>
+                </a:lnTo>
+                <a:lnTo>
+                  <a:pt x="120000" y="120000"/>
+                </a:lnTo>
+                <a:lnTo>
+                  <a:pt x="0" y="120000"/>
+                </a:lnTo>
+                <a:close/>
+              </a:path>
+            </a:pathLst>
+          </a:custGeom>
+        </p:spPr>
+      </p:sp>
+    </p:spTree>
+  </p:cSld>
+  <p:clrMapOvr>
+    <a:masterClrMapping/>
+  </p:clrMapOvr>
+</p:notes>
+</file>
+
+<file path=ppt/notesSlides/notesSlide7.xml><?xml version="1.0" encoding="utf-8"?>
+<p:notes xmlns:a="http://schemas.openxmlformats.org/drawingml/2006/main" xmlns:r="http://schemas.openxmlformats.org/officeDocument/2006/relationships" xmlns:p="http://schemas.openxmlformats.org/presentationml/2006/main" showMasterSp="0" showMasterPhAnim="0">
+  <p:cSld>
+    <p:spTree>
+      <p:nvGrpSpPr>
+        <p:cNvPr id="1" name="Shape 126"/>
+        <p:cNvGrpSpPr/>
+        <p:nvPr/>
+      </p:nvGrpSpPr>
+      <p:grpSpPr>
+        <a:xfrm>
+          <a:off x="0" y="0"/>
+          <a:ext cx="0" cy="0"/>
+          <a:chOff x="0" y="0"/>
+          <a:chExt cx="0" cy="0"/>
+        </a:xfrm>
+      </p:grpSpPr>
+      <p:sp>
+        <p:nvSpPr>
+          <p:cNvPr id="127" name="Google Shape;127;gf861cc4a69_0_36:notes"/>
+          <p:cNvSpPr txBox="1">
+            <a:spLocks noGrp="1"/>
+          </p:cNvSpPr>
+          <p:nvPr>
+            <p:ph type="body" idx="1"/>
+          </p:nvPr>
+        </p:nvSpPr>
+        <p:spPr>
+          <a:xfrm>
+            <a:off x="685800" y="4400550"/>
+            <a:ext cx="5486400" cy="3600600"/>
+          </a:xfrm>
+          <a:prstGeom prst="rect">
+            <a:avLst/>
+          </a:prstGeom>
+        </p:spPr>
+        <p:txBody>
+          <a:bodyPr spcFirstLastPara="1" wrap="square" lIns="91425" tIns="45700" rIns="91425" bIns="45700" anchor="t" anchorCtr="0">
+            <a:noAutofit/>
+          </a:bodyPr>
+          <a:lstStyle/>
+          <a:p>
+            <a:pPr marL="0" lvl="0" indent="0" algn="just" rtl="0">
+              <a:lnSpc>
+                <a:spcPct val="95000"/>
+              </a:lnSpc>
+              <a:spcBef>
+                <a:spcPts val="0"/>
+              </a:spcBef>
+              <a:spcAft>
+                <a:spcPts val="0"/>
+              </a:spcAft>
+              <a:buClr>
+                <a:schemeClr val="dk1"/>
+              </a:buClr>
+              <a:buSzPts val="1100"/>
+              <a:buFont typeface="Arial"/>
+              <a:buNone/>
+            </a:pPr>
+            <a:endParaRPr sz="1000">
+              <a:solidFill>
+                <a:schemeClr val="dk1"/>
+              </a:solidFill>
+              <a:latin typeface="Times New Roman"/>
+              <a:ea typeface="Times New Roman"/>
+              <a:cs typeface="Times New Roman"/>
+              <a:sym typeface="Times New Roman"/>
+            </a:endParaRPr>
+          </a:p>
+          <a:p>
+            <a:pPr marL="0" lvl="0" indent="0" algn="l" rtl="0">
+              <a:spcBef>
+                <a:spcPts val="600"/>
+              </a:spcBef>
+              <a:spcAft>
+                <a:spcPts val="0"/>
+              </a:spcAft>
+              <a:buNone/>
+            </a:pPr>
+            <a:endParaRPr/>
+          </a:p>
+        </p:txBody>
+      </p:sp>
+      <p:sp>
+        <p:nvSpPr>
+          <p:cNvPr id="128" name="Google Shape;128;gf861cc4a69_0_36:notes"/>
           <p:cNvSpPr>
             <a:spLocks noGrp="1" noRot="1" noChangeAspect="1"/>
           </p:cNvSpPr>
@@ -8612,7 +8745,7 @@
                   <a:schemeClr val="dk1"/>
                 </a:solidFill>
               </a:rPr>
-              <a:t>End product will be able to accept a snippet of a song, vectorize, and classify by genre</a:t>
+              <a:t>End product will be able to accept preprocessed song metadata, vectorize, and classify by genre</a:t>
             </a:r>
             <a:endParaRPr sz="1800">
               <a:solidFill>
@@ -8863,7 +8996,7 @@
             </a:pPr>
             <a:r>
               <a:rPr lang="en-US" sz="3000"/>
-              <a:t>Model Architecture</a:t>
+              <a:t>Data V's</a:t>
             </a:r>
             <a:endParaRPr sz="3000"/>
           </a:p>
@@ -8877,7 +9010,234 @@
         </p:nvSpPr>
         <p:spPr>
           <a:xfrm>
-            <a:off x="2832150" y="3958450"/>
+            <a:off x="247675" y="1150125"/>
+            <a:ext cx="4251600" cy="3285600"/>
+          </a:xfrm>
+          <a:prstGeom prst="rect">
+            <a:avLst/>
+          </a:prstGeom>
+          <a:noFill/>
+          <a:ln>
+            <a:noFill/>
+          </a:ln>
+        </p:spPr>
+        <p:txBody>
+          <a:bodyPr spcFirstLastPara="1" wrap="square" lIns="91425" tIns="91425" rIns="91425" bIns="91425" anchor="t" anchorCtr="0">
+            <a:noAutofit/>
+          </a:bodyPr>
+          <a:lstStyle/>
+          <a:p>
+            <a:pPr marL="457200" lvl="0" indent="-342900" algn="l" rtl="0">
+              <a:lnSpc>
+                <a:spcPct val="95000"/>
+              </a:lnSpc>
+              <a:spcBef>
+                <a:spcPts val="0"/>
+              </a:spcBef>
+              <a:spcAft>
+                <a:spcPts val="0"/>
+              </a:spcAft>
+              <a:buClr>
+                <a:schemeClr val="dk1"/>
+              </a:buClr>
+              <a:buSzPts val="1800"/>
+              <a:buChar char="●"/>
+            </a:pPr>
+            <a:r>
+              <a:rPr lang="en-US" sz="1800" b="1">
+                <a:solidFill>
+                  <a:schemeClr val="dk1"/>
+                </a:solidFill>
+              </a:rPr>
+              <a:t>Volume</a:t>
+            </a:r>
+            <a:endParaRPr sz="1800" b="1">
+              <a:solidFill>
+                <a:schemeClr val="dk1"/>
+              </a:solidFill>
+            </a:endParaRPr>
+          </a:p>
+          <a:p>
+            <a:pPr marL="914400" lvl="1" indent="-342900" algn="l" rtl="0">
+              <a:lnSpc>
+                <a:spcPct val="95000"/>
+              </a:lnSpc>
+              <a:spcBef>
+                <a:spcPts val="0"/>
+              </a:spcBef>
+              <a:spcAft>
+                <a:spcPts val="0"/>
+              </a:spcAft>
+              <a:buClr>
+                <a:schemeClr val="dk1"/>
+              </a:buClr>
+              <a:buSzPts val="1800"/>
+              <a:buChar char="○"/>
+            </a:pPr>
+            <a:r>
+              <a:rPr lang="en-US" sz="1800">
+                <a:solidFill>
+                  <a:schemeClr val="dk1"/>
+                </a:solidFill>
+              </a:rPr>
+              <a:t>10,000+ songs will be processed</a:t>
+            </a:r>
+            <a:endParaRPr sz="1800">
+              <a:solidFill>
+                <a:schemeClr val="dk1"/>
+              </a:solidFill>
+            </a:endParaRPr>
+          </a:p>
+          <a:p>
+            <a:pPr marL="457200" lvl="0" indent="-342900" algn="l" rtl="0">
+              <a:lnSpc>
+                <a:spcPct val="95000"/>
+              </a:lnSpc>
+              <a:spcBef>
+                <a:spcPts val="0"/>
+              </a:spcBef>
+              <a:spcAft>
+                <a:spcPts val="0"/>
+              </a:spcAft>
+              <a:buClr>
+                <a:schemeClr val="dk1"/>
+              </a:buClr>
+              <a:buSzPts val="1800"/>
+              <a:buChar char="●"/>
+            </a:pPr>
+            <a:r>
+              <a:rPr lang="en-US" sz="1800" b="1">
+                <a:solidFill>
+                  <a:schemeClr val="dk1"/>
+                </a:solidFill>
+              </a:rPr>
+              <a:t>Variety</a:t>
+            </a:r>
+            <a:endParaRPr sz="1800" b="1">
+              <a:solidFill>
+                <a:schemeClr val="dk1"/>
+              </a:solidFill>
+            </a:endParaRPr>
+          </a:p>
+          <a:p>
+            <a:pPr marL="914400" lvl="1" indent="-342900" algn="l" rtl="0">
+              <a:lnSpc>
+                <a:spcPct val="95000"/>
+              </a:lnSpc>
+              <a:spcBef>
+                <a:spcPts val="0"/>
+              </a:spcBef>
+              <a:spcAft>
+                <a:spcPts val="0"/>
+              </a:spcAft>
+              <a:buClr>
+                <a:schemeClr val="dk1"/>
+              </a:buClr>
+              <a:buSzPts val="1800"/>
+              <a:buChar char="○"/>
+            </a:pPr>
+            <a:r>
+              <a:rPr lang="en-US" sz="1800">
+                <a:solidFill>
+                  <a:schemeClr val="dk1"/>
+                </a:solidFill>
+              </a:rPr>
+              <a:t>All song metadata structured in json format</a:t>
+            </a:r>
+            <a:endParaRPr sz="1800">
+              <a:solidFill>
+                <a:schemeClr val="dk1"/>
+              </a:solidFill>
+            </a:endParaRPr>
+          </a:p>
+          <a:p>
+            <a:pPr marL="457200" lvl="0" indent="-342900" algn="l" rtl="0">
+              <a:lnSpc>
+                <a:spcPct val="95000"/>
+              </a:lnSpc>
+              <a:spcBef>
+                <a:spcPts val="0"/>
+              </a:spcBef>
+              <a:spcAft>
+                <a:spcPts val="0"/>
+              </a:spcAft>
+              <a:buClr>
+                <a:schemeClr val="dk1"/>
+              </a:buClr>
+              <a:buSzPts val="1800"/>
+              <a:buChar char="●"/>
+            </a:pPr>
+            <a:r>
+              <a:rPr lang="en-US" sz="1800" b="1">
+                <a:solidFill>
+                  <a:schemeClr val="dk1"/>
+                </a:solidFill>
+              </a:rPr>
+              <a:t>Velocity</a:t>
+            </a:r>
+            <a:endParaRPr sz="1800" b="1">
+              <a:solidFill>
+                <a:schemeClr val="dk1"/>
+              </a:solidFill>
+            </a:endParaRPr>
+          </a:p>
+          <a:p>
+            <a:pPr marL="914400" lvl="1" indent="-342900" algn="l" rtl="0">
+              <a:lnSpc>
+                <a:spcPct val="95000"/>
+              </a:lnSpc>
+              <a:spcBef>
+                <a:spcPts val="0"/>
+              </a:spcBef>
+              <a:spcAft>
+                <a:spcPts val="0"/>
+              </a:spcAft>
+              <a:buClr>
+                <a:schemeClr val="dk1"/>
+              </a:buClr>
+              <a:buSzPts val="1800"/>
+              <a:buChar char="○"/>
+            </a:pPr>
+            <a:r>
+              <a:rPr lang="en-US" sz="1800">
+                <a:solidFill>
+                  <a:schemeClr val="dk1"/>
+                </a:solidFill>
+              </a:rPr>
+              <a:t>Data not time sensitive</a:t>
+            </a:r>
+            <a:endParaRPr sz="1800">
+              <a:solidFill>
+                <a:schemeClr val="dk1"/>
+              </a:solidFill>
+            </a:endParaRPr>
+          </a:p>
+          <a:p>
+            <a:pPr marL="0" lvl="0" indent="0" algn="l" rtl="0">
+              <a:lnSpc>
+                <a:spcPct val="115000"/>
+              </a:lnSpc>
+              <a:spcBef>
+                <a:spcPts val="600"/>
+              </a:spcBef>
+              <a:spcAft>
+                <a:spcPts val="0"/>
+              </a:spcAft>
+              <a:buNone/>
+            </a:pPr>
+            <a:endParaRPr sz="1800"/>
+          </a:p>
+        </p:txBody>
+      </p:sp>
+      <p:sp>
+        <p:nvSpPr>
+          <p:cNvPr id="90" name="Google Shape;90;p16"/>
+          <p:cNvSpPr txBox="1"/>
+          <p:nvPr/>
+        </p:nvSpPr>
+        <p:spPr>
+          <a:xfrm>
+            <a:off x="5021875" y="3940650"/>
             <a:ext cx="3479400" cy="400200"/>
           </a:xfrm>
           <a:prstGeom prst="rect">
@@ -8905,7 +9265,7 @@
             </a:pPr>
             <a:r>
               <a:rPr lang="en-US" i="1"/>
-              <a:t>Fig 2. System Diagram</a:t>
+              <a:t>Fig 2. Song metadata</a:t>
             </a:r>
             <a:endParaRPr i="1"/>
           </a:p>
@@ -8913,7 +9273,7 @@
       </p:sp>
       <p:pic>
         <p:nvPicPr>
-          <p:cNvPr id="90" name="Google Shape;90;p16"/>
+          <p:cNvPr id="91" name="Google Shape;91;p16"/>
           <p:cNvPicPr preferRelativeResize="0"/>
           <p:nvPr/>
         </p:nvPicPr>
@@ -8927,8 +9287,8 @@
         </p:blipFill>
         <p:spPr>
           <a:xfrm>
-            <a:off x="300400" y="1148138"/>
-            <a:ext cx="8651834" cy="2847225"/>
+            <a:off x="5021875" y="618625"/>
+            <a:ext cx="3575799" cy="3265800"/>
           </a:xfrm>
           <a:prstGeom prst="rect">
             <a:avLst/>
@@ -8952,7 +9312,7 @@
   <p:cSld>
     <p:spTree>
       <p:nvGrpSpPr>
-        <p:cNvPr id="1" name="Shape 94"/>
+        <p:cNvPr id="1" name="Shape 95"/>
         <p:cNvGrpSpPr/>
         <p:nvPr/>
       </p:nvGrpSpPr>
@@ -8966,7 +9326,7 @@
       </p:grpSpPr>
       <p:grpSp>
         <p:nvGrpSpPr>
-          <p:cNvPr id="95" name="Google Shape;95;p17"/>
+          <p:cNvPr id="96" name="Google Shape;96;p17"/>
           <p:cNvGrpSpPr/>
           <p:nvPr/>
         </p:nvGrpSpPr>
@@ -8980,7 +9340,7 @@
         </p:grpSpPr>
         <p:sp>
           <p:nvSpPr>
-            <p:cNvPr id="96" name="Google Shape;96;p17"/>
+            <p:cNvPr id="97" name="Google Shape;97;p17"/>
             <p:cNvSpPr/>
             <p:nvPr/>
           </p:nvSpPr>
@@ -9020,7 +9380,7 @@
         </p:sp>
         <p:pic>
           <p:nvPicPr>
-            <p:cNvPr id="97" name="Google Shape;97;p17"/>
+            <p:cNvPr id="98" name="Google Shape;98;p17"/>
             <p:cNvPicPr preferRelativeResize="0"/>
             <p:nvPr/>
           </p:nvPicPr>
@@ -9049,7 +9409,7 @@
       </p:grpSp>
       <p:sp>
         <p:nvSpPr>
-          <p:cNvPr id="98" name="Google Shape;98;p17"/>
+          <p:cNvPr id="99" name="Google Shape;99;p17"/>
           <p:cNvSpPr txBox="1">
             <a:spLocks noGrp="1"/>
           </p:cNvSpPr>
@@ -9095,7 +9455,7 @@
             </a:pPr>
             <a:r>
               <a:rPr lang="en-US" sz="3000"/>
-              <a:t>Required Tools</a:t>
+              <a:t>Model Architecture</a:t>
             </a:r>
             <a:endParaRPr sz="3000"/>
           </a:p>
@@ -9103,489 +9463,14 @@
       </p:sp>
       <p:sp>
         <p:nvSpPr>
-          <p:cNvPr id="99" name="Google Shape;99;p17"/>
+          <p:cNvPr id="100" name="Google Shape;100;p17"/>
           <p:cNvSpPr txBox="1"/>
           <p:nvPr/>
         </p:nvSpPr>
         <p:spPr>
           <a:xfrm>
-            <a:off x="247675" y="1150125"/>
-            <a:ext cx="5080800" cy="3285600"/>
-          </a:xfrm>
-          <a:prstGeom prst="rect">
-            <a:avLst/>
-          </a:prstGeom>
-          <a:noFill/>
-          <a:ln>
-            <a:noFill/>
-          </a:ln>
-        </p:spPr>
-        <p:txBody>
-          <a:bodyPr spcFirstLastPara="1" wrap="square" lIns="91425" tIns="91425" rIns="91425" bIns="91425" anchor="t" anchorCtr="0">
-            <a:noAutofit/>
-          </a:bodyPr>
-          <a:lstStyle/>
-          <a:p>
-            <a:pPr marL="457200" lvl="0" indent="-317500" algn="l" rtl="0">
-              <a:lnSpc>
-                <a:spcPct val="95000"/>
-              </a:lnSpc>
-              <a:spcBef>
-                <a:spcPts val="0"/>
-              </a:spcBef>
-              <a:spcAft>
-                <a:spcPts val="0"/>
-              </a:spcAft>
-              <a:buClr>
-                <a:schemeClr val="dk1"/>
-              </a:buClr>
-              <a:buSzPts val="1400"/>
-              <a:buChar char="●"/>
-            </a:pPr>
-            <a:r>
-              <a:rPr lang="en-US">
-                <a:solidFill>
-                  <a:schemeClr val="dk1"/>
-                </a:solidFill>
-              </a:rPr>
-              <a:t>Spotify Developer API</a:t>
-            </a:r>
-            <a:endParaRPr>
-              <a:solidFill>
-                <a:schemeClr val="dk1"/>
-              </a:solidFill>
-            </a:endParaRPr>
-          </a:p>
-          <a:p>
-            <a:pPr marL="914400" lvl="1" indent="-317500" algn="l" rtl="0">
-              <a:lnSpc>
-                <a:spcPct val="95000"/>
-              </a:lnSpc>
-              <a:spcBef>
-                <a:spcPts val="0"/>
-              </a:spcBef>
-              <a:spcAft>
-                <a:spcPts val="0"/>
-              </a:spcAft>
-              <a:buClr>
-                <a:schemeClr val="dk1"/>
-              </a:buClr>
-              <a:buSzPts val="1400"/>
-              <a:buChar char="○"/>
-            </a:pPr>
-            <a:r>
-              <a:rPr lang="en-US">
-                <a:solidFill>
-                  <a:schemeClr val="dk1"/>
-                </a:solidFill>
-              </a:rPr>
-              <a:t>Source song metadata / mp3 samples </a:t>
-            </a:r>
-            <a:endParaRPr>
-              <a:solidFill>
-                <a:schemeClr val="dk1"/>
-              </a:solidFill>
-            </a:endParaRPr>
-          </a:p>
-          <a:p>
-            <a:pPr marL="914400" lvl="1" indent="-317500" algn="l" rtl="0">
-              <a:lnSpc>
-                <a:spcPct val="95000"/>
-              </a:lnSpc>
-              <a:spcBef>
-                <a:spcPts val="0"/>
-              </a:spcBef>
-              <a:spcAft>
-                <a:spcPts val="0"/>
-              </a:spcAft>
-              <a:buClr>
-                <a:schemeClr val="dk1"/>
-              </a:buClr>
-              <a:buSzPts val="1400"/>
-              <a:buChar char="○"/>
-            </a:pPr>
-            <a:r>
-              <a:rPr lang="en-US">
-                <a:solidFill>
-                  <a:schemeClr val="dk1"/>
-                </a:solidFill>
-              </a:rPr>
-              <a:t>30 second snippets available for select songs</a:t>
-            </a:r>
-            <a:endParaRPr>
-              <a:solidFill>
-                <a:schemeClr val="dk1"/>
-              </a:solidFill>
-            </a:endParaRPr>
-          </a:p>
-          <a:p>
-            <a:pPr marL="457200" lvl="0" indent="-317500" algn="l" rtl="0">
-              <a:lnSpc>
-                <a:spcPct val="95000"/>
-              </a:lnSpc>
-              <a:spcBef>
-                <a:spcPts val="0"/>
-              </a:spcBef>
-              <a:spcAft>
-                <a:spcPts val="0"/>
-              </a:spcAft>
-              <a:buClr>
-                <a:schemeClr val="dk1"/>
-              </a:buClr>
-              <a:buSzPts val="1400"/>
-              <a:buChar char="●"/>
-            </a:pPr>
-            <a:r>
-              <a:rPr lang="en-US">
-                <a:solidFill>
-                  <a:schemeClr val="dk1"/>
-                </a:solidFill>
-              </a:rPr>
-              <a:t>Google Cloud Platform </a:t>
-            </a:r>
-            <a:endParaRPr>
-              <a:solidFill>
-                <a:schemeClr val="dk1"/>
-              </a:solidFill>
-            </a:endParaRPr>
-          </a:p>
-          <a:p>
-            <a:pPr marL="914400" lvl="1" indent="-317500" algn="l" rtl="0">
-              <a:lnSpc>
-                <a:spcPct val="95000"/>
-              </a:lnSpc>
-              <a:spcBef>
-                <a:spcPts val="0"/>
-              </a:spcBef>
-              <a:spcAft>
-                <a:spcPts val="0"/>
-              </a:spcAft>
-              <a:buClr>
-                <a:schemeClr val="dk1"/>
-              </a:buClr>
-              <a:buSzPts val="1400"/>
-              <a:buChar char="○"/>
-            </a:pPr>
-            <a:r>
-              <a:rPr lang="en-US">
-                <a:solidFill>
-                  <a:schemeClr val="dk1"/>
-                </a:solidFill>
-              </a:rPr>
-              <a:t>Run jobs to train model with Dataproc</a:t>
-            </a:r>
-            <a:endParaRPr>
-              <a:solidFill>
-                <a:schemeClr val="dk1"/>
-              </a:solidFill>
-            </a:endParaRPr>
-          </a:p>
-          <a:p>
-            <a:pPr marL="914400" lvl="1" indent="-317500" algn="l" rtl="0">
-              <a:lnSpc>
-                <a:spcPct val="95000"/>
-              </a:lnSpc>
-              <a:spcBef>
-                <a:spcPts val="0"/>
-              </a:spcBef>
-              <a:spcAft>
-                <a:spcPts val="0"/>
-              </a:spcAft>
-              <a:buClr>
-                <a:schemeClr val="dk1"/>
-              </a:buClr>
-              <a:buSzPts val="1400"/>
-              <a:buChar char="○"/>
-            </a:pPr>
-            <a:r>
-              <a:rPr lang="en-US">
-                <a:solidFill>
-                  <a:schemeClr val="dk1"/>
-                </a:solidFill>
-              </a:rPr>
-              <a:t>Store processed song data with BigQuery</a:t>
-            </a:r>
-            <a:endParaRPr>
-              <a:solidFill>
-                <a:schemeClr val="dk1"/>
-              </a:solidFill>
-            </a:endParaRPr>
-          </a:p>
-          <a:p>
-            <a:pPr marL="457200" lvl="0" indent="-317500" algn="l" rtl="0">
-              <a:lnSpc>
-                <a:spcPct val="95000"/>
-              </a:lnSpc>
-              <a:spcBef>
-                <a:spcPts val="0"/>
-              </a:spcBef>
-              <a:spcAft>
-                <a:spcPts val="0"/>
-              </a:spcAft>
-              <a:buClr>
-                <a:schemeClr val="dk1"/>
-              </a:buClr>
-              <a:buSzPts val="1400"/>
-              <a:buChar char="●"/>
-            </a:pPr>
-            <a:r>
-              <a:rPr lang="en-US">
-                <a:solidFill>
-                  <a:schemeClr val="dk1"/>
-                </a:solidFill>
-              </a:rPr>
-              <a:t>Spark ML Library</a:t>
-            </a:r>
-            <a:endParaRPr>
-              <a:solidFill>
-                <a:schemeClr val="dk1"/>
-              </a:solidFill>
-            </a:endParaRPr>
-          </a:p>
-          <a:p>
-            <a:pPr marL="914400" lvl="1" indent="-317500" algn="l" rtl="0">
-              <a:lnSpc>
-                <a:spcPct val="95000"/>
-              </a:lnSpc>
-              <a:spcBef>
-                <a:spcPts val="0"/>
-              </a:spcBef>
-              <a:spcAft>
-                <a:spcPts val="0"/>
-              </a:spcAft>
-              <a:buClr>
-                <a:schemeClr val="dk1"/>
-              </a:buClr>
-              <a:buSzPts val="1400"/>
-              <a:buChar char="○"/>
-            </a:pPr>
-            <a:r>
-              <a:rPr lang="en-US">
-                <a:solidFill>
-                  <a:schemeClr val="dk1"/>
-                </a:solidFill>
-              </a:rPr>
-              <a:t>Use built in spark tools (MapReduce, k-means) for model pipeline</a:t>
-            </a:r>
-            <a:endParaRPr>
-              <a:solidFill>
-                <a:schemeClr val="dk1"/>
-              </a:solidFill>
-            </a:endParaRPr>
-          </a:p>
-          <a:p>
-            <a:pPr marL="457200" lvl="0" indent="-317500" algn="l" rtl="0">
-              <a:lnSpc>
-                <a:spcPct val="95000"/>
-              </a:lnSpc>
-              <a:spcBef>
-                <a:spcPts val="0"/>
-              </a:spcBef>
-              <a:spcAft>
-                <a:spcPts val="0"/>
-              </a:spcAft>
-              <a:buClr>
-                <a:schemeClr val="dk1"/>
-              </a:buClr>
-              <a:buSzPts val="1400"/>
-              <a:buChar char="●"/>
-            </a:pPr>
-            <a:r>
-              <a:rPr lang="en-US">
-                <a:solidFill>
-                  <a:schemeClr val="dk1"/>
-                </a:solidFill>
-              </a:rPr>
-              <a:t>GitHub</a:t>
-            </a:r>
-            <a:endParaRPr>
-              <a:solidFill>
-                <a:schemeClr val="dk1"/>
-              </a:solidFill>
-            </a:endParaRPr>
-          </a:p>
-          <a:p>
-            <a:pPr marL="914400" lvl="1" indent="-317500" algn="l" rtl="0">
-              <a:lnSpc>
-                <a:spcPct val="95000"/>
-              </a:lnSpc>
-              <a:spcBef>
-                <a:spcPts val="0"/>
-              </a:spcBef>
-              <a:spcAft>
-                <a:spcPts val="0"/>
-              </a:spcAft>
-              <a:buClr>
-                <a:schemeClr val="dk1"/>
-              </a:buClr>
-              <a:buSzPts val="1400"/>
-              <a:buChar char="○"/>
-            </a:pPr>
-            <a:r>
-              <a:rPr lang="en-US">
-                <a:solidFill>
-                  <a:schemeClr val="dk1"/>
-                </a:solidFill>
-              </a:rPr>
-              <a:t>Shared repository for collaboration among teammates</a:t>
-            </a:r>
-            <a:endParaRPr>
-              <a:solidFill>
-                <a:schemeClr val="dk1"/>
-              </a:solidFill>
-            </a:endParaRPr>
-          </a:p>
-          <a:p>
-            <a:pPr marL="914400" lvl="1" indent="-317500" algn="l" rtl="0">
-              <a:lnSpc>
-                <a:spcPct val="95000"/>
-              </a:lnSpc>
-              <a:spcBef>
-                <a:spcPts val="0"/>
-              </a:spcBef>
-              <a:spcAft>
-                <a:spcPts val="0"/>
-              </a:spcAft>
-              <a:buClr>
-                <a:schemeClr val="dk1"/>
-              </a:buClr>
-              <a:buSzPts val="1400"/>
-              <a:buChar char="○"/>
-            </a:pPr>
-            <a:r>
-              <a:rPr lang="en-US" u="sng">
-                <a:solidFill>
-                  <a:schemeClr val="hlink"/>
-                </a:solidFill>
-                <a:hlinkClick r:id="rId4"/>
-              </a:rPr>
-              <a:t>https://github.com/athornton1618/SpotifyClassifier</a:t>
-            </a:r>
-            <a:r>
-              <a:rPr lang="en-US">
-                <a:solidFill>
-                  <a:schemeClr val="dk1"/>
-                </a:solidFill>
-              </a:rPr>
-              <a:t> </a:t>
-            </a:r>
-            <a:endParaRPr>
-              <a:solidFill>
-                <a:schemeClr val="dk1"/>
-              </a:solidFill>
-            </a:endParaRPr>
-          </a:p>
-          <a:p>
-            <a:pPr marL="0" lvl="0" indent="0" algn="l" rtl="0">
-              <a:lnSpc>
-                <a:spcPct val="115000"/>
-              </a:lnSpc>
-              <a:spcBef>
-                <a:spcPts val="600"/>
-              </a:spcBef>
-              <a:spcAft>
-                <a:spcPts val="0"/>
-              </a:spcAft>
-              <a:buNone/>
-            </a:pPr>
-            <a:endParaRPr sz="1500"/>
-          </a:p>
-        </p:txBody>
-      </p:sp>
-      <p:pic>
-        <p:nvPicPr>
-          <p:cNvPr id="100" name="Google Shape;100;p17"/>
-          <p:cNvPicPr preferRelativeResize="0"/>
-          <p:nvPr/>
-        </p:nvPicPr>
-        <p:blipFill>
-          <a:blip r:embed="rId5">
-            <a:alphaModFix/>
-          </a:blip>
-          <a:stretch>
-            <a:fillRect/>
-          </a:stretch>
-        </p:blipFill>
-        <p:spPr>
-          <a:xfrm>
-            <a:off x="5517875" y="603575"/>
-            <a:ext cx="3510726" cy="1843131"/>
-          </a:xfrm>
-          <a:prstGeom prst="rect">
-            <a:avLst/>
-          </a:prstGeom>
-          <a:noFill/>
-          <a:ln>
-            <a:noFill/>
-          </a:ln>
-        </p:spPr>
-      </p:pic>
-      <p:pic>
-        <p:nvPicPr>
-          <p:cNvPr id="101" name="Google Shape;101;p17"/>
-          <p:cNvPicPr preferRelativeResize="0"/>
-          <p:nvPr/>
-        </p:nvPicPr>
-        <p:blipFill>
-          <a:blip r:embed="rId6">
-            <a:alphaModFix/>
-          </a:blip>
-          <a:stretch>
-            <a:fillRect/>
-          </a:stretch>
-        </p:blipFill>
-        <p:spPr>
-          <a:xfrm>
-            <a:off x="5670313" y="2310463"/>
-            <a:ext cx="1315876" cy="1315876"/>
-          </a:xfrm>
-          <a:prstGeom prst="rect">
-            <a:avLst/>
-          </a:prstGeom>
-          <a:noFill/>
-          <a:ln>
-            <a:noFill/>
-          </a:ln>
-        </p:spPr>
-      </p:pic>
-      <p:pic>
-        <p:nvPicPr>
-          <p:cNvPr id="102" name="Google Shape;102;p17"/>
-          <p:cNvPicPr preferRelativeResize="0"/>
-          <p:nvPr/>
-        </p:nvPicPr>
-        <p:blipFill>
-          <a:blip r:embed="rId7">
-            <a:alphaModFix/>
-          </a:blip>
-          <a:stretch>
-            <a:fillRect/>
-          </a:stretch>
-        </p:blipFill>
-        <p:spPr>
-          <a:xfrm>
-            <a:off x="7280153" y="2529925"/>
-            <a:ext cx="1689246" cy="877000"/>
-          </a:xfrm>
-          <a:prstGeom prst="rect">
-            <a:avLst/>
-          </a:prstGeom>
-          <a:noFill/>
-          <a:ln>
-            <a:noFill/>
-          </a:ln>
-        </p:spPr>
-      </p:pic>
-      <p:sp>
-        <p:nvSpPr>
-          <p:cNvPr id="103" name="Google Shape;103;p17"/>
-          <p:cNvSpPr txBox="1"/>
-          <p:nvPr/>
-        </p:nvSpPr>
-        <p:spPr>
-          <a:xfrm>
-            <a:off x="5670313" y="3884300"/>
-            <a:ext cx="3303000" cy="400200"/>
+            <a:off x="2832150" y="3958450"/>
+            <a:ext cx="3479400" cy="400200"/>
           </a:xfrm>
           <a:prstGeom prst="rect">
             <a:avLst/>
@@ -9612,12 +9497,40 @@
             </a:pPr>
             <a:r>
               <a:rPr lang="en-US" i="1"/>
-              <a:t>Fig 3. Tools (GCP, GitHub, Spark)</a:t>
+              <a:t>Fig 2. System Diagram</a:t>
             </a:r>
             <a:endParaRPr i="1"/>
           </a:p>
         </p:txBody>
       </p:sp>
+      <p:pic>
+        <p:nvPicPr>
+          <p:cNvPr id="101" name="Google Shape;101;p17"/>
+          <p:cNvPicPr preferRelativeResize="0"/>
+          <p:nvPr/>
+        </p:nvPicPr>
+        <p:blipFill>
+          <a:blip r:embed="rId4">
+            <a:alphaModFix/>
+          </a:blip>
+          <a:stretch>
+            <a:fillRect/>
+          </a:stretch>
+        </p:blipFill>
+        <p:spPr>
+          <a:xfrm>
+            <a:off x="622380" y="911400"/>
+            <a:ext cx="7898945" cy="3047050"/>
+          </a:xfrm>
+          <a:prstGeom prst="rect">
+            <a:avLst/>
+          </a:prstGeom>
+          <a:noFill/>
+          <a:ln>
+            <a:noFill/>
+          </a:ln>
+        </p:spPr>
+      </p:pic>
     </p:spTree>
   </p:cSld>
   <p:clrMapOvr>
@@ -9631,7 +9544,7 @@
   <p:cSld>
     <p:spTree>
       <p:nvGrpSpPr>
-        <p:cNvPr id="1" name="Shape 107"/>
+        <p:cNvPr id="1" name="Shape 105"/>
         <p:cNvGrpSpPr/>
         <p:nvPr/>
       </p:nvGrpSpPr>
@@ -9645,7 +9558,7 @@
       </p:grpSpPr>
       <p:grpSp>
         <p:nvGrpSpPr>
-          <p:cNvPr id="108" name="Google Shape;108;p18"/>
+          <p:cNvPr id="106" name="Google Shape;106;p18"/>
           <p:cNvGrpSpPr/>
           <p:nvPr/>
         </p:nvGrpSpPr>
@@ -9659,7 +9572,7 @@
         </p:grpSpPr>
         <p:sp>
           <p:nvSpPr>
-            <p:cNvPr id="109" name="Google Shape;109;p18"/>
+            <p:cNvPr id="107" name="Google Shape;107;p18"/>
             <p:cNvSpPr/>
             <p:nvPr/>
           </p:nvSpPr>
@@ -9699,7 +9612,7 @@
         </p:sp>
         <p:pic>
           <p:nvPicPr>
-            <p:cNvPr id="110" name="Google Shape;110;p18"/>
+            <p:cNvPr id="108" name="Google Shape;108;p18"/>
             <p:cNvPicPr preferRelativeResize="0"/>
             <p:nvPr/>
           </p:nvPicPr>
@@ -9728,7 +9641,7 @@
       </p:grpSp>
       <p:sp>
         <p:nvSpPr>
-          <p:cNvPr id="111" name="Google Shape;111;p18"/>
+          <p:cNvPr id="109" name="Google Shape;109;p18"/>
           <p:cNvSpPr txBox="1">
             <a:spLocks noGrp="1"/>
           </p:cNvSpPr>
@@ -9739,7 +9652,7 @@
         <p:spPr>
           <a:xfrm>
             <a:off x="247675" y="66600"/>
-            <a:ext cx="4593600" cy="692400"/>
+            <a:ext cx="6272400" cy="692400"/>
           </a:xfrm>
           <a:prstGeom prst="rect">
             <a:avLst/>
@@ -9774,7 +9687,7 @@
             </a:pPr>
             <a:r>
               <a:rPr lang="en-US" sz="3000"/>
-              <a:t>Reference Material</a:t>
+              <a:t>Methods (Tools + Algorithms)</a:t>
             </a:r>
             <a:endParaRPr sz="3000"/>
           </a:p>
@@ -9782,14 +9695,14 @@
       </p:sp>
       <p:sp>
         <p:nvSpPr>
-          <p:cNvPr id="112" name="Google Shape;112;p18"/>
+          <p:cNvPr id="110" name="Google Shape;110;p18"/>
           <p:cNvSpPr txBox="1"/>
           <p:nvPr/>
         </p:nvSpPr>
         <p:spPr>
           <a:xfrm>
             <a:off x="247675" y="1150125"/>
-            <a:ext cx="4496100" cy="3285600"/>
+            <a:ext cx="5080800" cy="3285600"/>
           </a:xfrm>
           <a:prstGeom prst="rect">
             <a:avLst/>
@@ -9805,7 +9718,7 @@
           </a:bodyPr>
           <a:lstStyle/>
           <a:p>
-            <a:pPr marL="0" lvl="0" indent="0" algn="l" rtl="0">
+            <a:pPr marL="457200" lvl="0" indent="-317500" algn="l" rtl="0">
               <a:lnSpc>
                 <a:spcPct val="95000"/>
               </a:lnSpc>
@@ -9815,30 +9728,340 @@
               <a:spcAft>
                 <a:spcPts val="0"/>
               </a:spcAft>
-              <a:buNone/>
+              <a:buClr>
+                <a:schemeClr val="dk1"/>
+              </a:buClr>
+              <a:buSzPts val="1400"/>
+              <a:buChar char="●"/>
             </a:pPr>
             <a:r>
-              <a:rPr lang="en-US"/>
-              <a:t>[1]  </a:t>
+              <a:rPr lang="en-US">
+                <a:solidFill>
+                  <a:schemeClr val="dk1"/>
+                </a:solidFill>
+              </a:rPr>
+              <a:t>Spotify Developer API</a:t>
             </a:r>
+            <a:endParaRPr>
+              <a:solidFill>
+                <a:schemeClr val="dk1"/>
+              </a:solidFill>
+            </a:endParaRPr>
+          </a:p>
+          <a:p>
+            <a:pPr marL="914400" lvl="1" indent="-317500" algn="l" rtl="0">
+              <a:lnSpc>
+                <a:spcPct val="95000"/>
+              </a:lnSpc>
+              <a:spcBef>
+                <a:spcPts val="0"/>
+              </a:spcBef>
+              <a:spcAft>
+                <a:spcPts val="0"/>
+              </a:spcAft>
+              <a:buClr>
+                <a:schemeClr val="dk1"/>
+              </a:buClr>
+              <a:buSzPts val="1400"/>
+              <a:buChar char="○"/>
+            </a:pPr>
             <a:r>
-              <a:rPr lang="en-US" sz="1800" u="sng">
+              <a:rPr lang="en-US">
+                <a:solidFill>
+                  <a:schemeClr val="dk1"/>
+                </a:solidFill>
+              </a:rPr>
+              <a:t>Source song metadata / features</a:t>
+            </a:r>
+            <a:endParaRPr>
+              <a:solidFill>
+                <a:schemeClr val="dk1"/>
+              </a:solidFill>
+            </a:endParaRPr>
+          </a:p>
+          <a:p>
+            <a:pPr marL="914400" lvl="1" indent="-317500" algn="l" rtl="0">
+              <a:lnSpc>
+                <a:spcPct val="95000"/>
+              </a:lnSpc>
+              <a:spcBef>
+                <a:spcPts val="0"/>
+              </a:spcBef>
+              <a:spcAft>
+                <a:spcPts val="0"/>
+              </a:spcAft>
+              <a:buClr>
+                <a:schemeClr val="dk1"/>
+              </a:buClr>
+              <a:buSzPts val="1400"/>
+              <a:buChar char="○"/>
+            </a:pPr>
+            <a:r>
+              <a:rPr lang="en-US">
+                <a:solidFill>
+                  <a:schemeClr val="dk1"/>
+                </a:solidFill>
+              </a:rPr>
+              <a:t>Find songs from recommendations by genre</a:t>
+            </a:r>
+            <a:endParaRPr>
+              <a:solidFill>
+                <a:schemeClr val="dk1"/>
+              </a:solidFill>
+            </a:endParaRPr>
+          </a:p>
+          <a:p>
+            <a:pPr marL="457200" lvl="0" indent="-317500" algn="l" rtl="0">
+              <a:lnSpc>
+                <a:spcPct val="95000"/>
+              </a:lnSpc>
+              <a:spcBef>
+                <a:spcPts val="0"/>
+              </a:spcBef>
+              <a:spcAft>
+                <a:spcPts val="0"/>
+              </a:spcAft>
+              <a:buClr>
+                <a:schemeClr val="dk1"/>
+              </a:buClr>
+              <a:buSzPts val="1400"/>
+              <a:buChar char="●"/>
+            </a:pPr>
+            <a:r>
+              <a:rPr lang="en-US">
+                <a:solidFill>
+                  <a:schemeClr val="dk1"/>
+                </a:solidFill>
+              </a:rPr>
+              <a:t>Google Cloud Platform </a:t>
+            </a:r>
+            <a:endParaRPr>
+              <a:solidFill>
+                <a:schemeClr val="dk1"/>
+              </a:solidFill>
+            </a:endParaRPr>
+          </a:p>
+          <a:p>
+            <a:pPr marL="914400" lvl="1" indent="-317500" algn="l" rtl="0">
+              <a:lnSpc>
+                <a:spcPct val="95000"/>
+              </a:lnSpc>
+              <a:spcBef>
+                <a:spcPts val="0"/>
+              </a:spcBef>
+              <a:spcAft>
+                <a:spcPts val="0"/>
+              </a:spcAft>
+              <a:buClr>
+                <a:schemeClr val="dk1"/>
+              </a:buClr>
+              <a:buSzPts val="1400"/>
+              <a:buChar char="○"/>
+            </a:pPr>
+            <a:r>
+              <a:rPr lang="en-US">
+                <a:solidFill>
+                  <a:schemeClr val="dk1"/>
+                </a:solidFill>
+              </a:rPr>
+              <a:t>Run jobs to train model with Dataproc</a:t>
+            </a:r>
+            <a:endParaRPr>
+              <a:solidFill>
+                <a:schemeClr val="dk1"/>
+              </a:solidFill>
+            </a:endParaRPr>
+          </a:p>
+          <a:p>
+            <a:pPr marL="914400" lvl="1" indent="-317500" algn="l" rtl="0">
+              <a:lnSpc>
+                <a:spcPct val="95000"/>
+              </a:lnSpc>
+              <a:spcBef>
+                <a:spcPts val="0"/>
+              </a:spcBef>
+              <a:spcAft>
+                <a:spcPts val="0"/>
+              </a:spcAft>
+              <a:buClr>
+                <a:schemeClr val="dk1"/>
+              </a:buClr>
+              <a:buSzPts val="1400"/>
+              <a:buChar char="○"/>
+            </a:pPr>
+            <a:r>
+              <a:rPr lang="en-US">
+                <a:solidFill>
+                  <a:schemeClr val="dk1"/>
+                </a:solidFill>
+              </a:rPr>
+              <a:t>Store processed song data with BigQuery</a:t>
+            </a:r>
+            <a:endParaRPr>
+              <a:solidFill>
+                <a:schemeClr val="dk1"/>
+              </a:solidFill>
+            </a:endParaRPr>
+          </a:p>
+          <a:p>
+            <a:pPr marL="457200" lvl="0" indent="-317500" algn="l" rtl="0">
+              <a:lnSpc>
+                <a:spcPct val="95000"/>
+              </a:lnSpc>
+              <a:spcBef>
+                <a:spcPts val="0"/>
+              </a:spcBef>
+              <a:spcAft>
+                <a:spcPts val="0"/>
+              </a:spcAft>
+              <a:buClr>
+                <a:schemeClr val="dk1"/>
+              </a:buClr>
+              <a:buSzPts val="1400"/>
+              <a:buChar char="●"/>
+            </a:pPr>
+            <a:r>
+              <a:rPr lang="en-US">
+                <a:solidFill>
+                  <a:schemeClr val="dk1"/>
+                </a:solidFill>
+              </a:rPr>
+              <a:t>Spark ML Library</a:t>
+            </a:r>
+            <a:endParaRPr>
+              <a:solidFill>
+                <a:schemeClr val="dk1"/>
+              </a:solidFill>
+            </a:endParaRPr>
+          </a:p>
+          <a:p>
+            <a:pPr marL="914400" lvl="1" indent="-317500" algn="l" rtl="0">
+              <a:lnSpc>
+                <a:spcPct val="95000"/>
+              </a:lnSpc>
+              <a:spcBef>
+                <a:spcPts val="0"/>
+              </a:spcBef>
+              <a:spcAft>
+                <a:spcPts val="0"/>
+              </a:spcAft>
+              <a:buClr>
+                <a:schemeClr val="dk1"/>
+              </a:buClr>
+              <a:buSzPts val="1400"/>
+              <a:buChar char="○"/>
+            </a:pPr>
+            <a:r>
+              <a:rPr lang="en-US">
+                <a:solidFill>
+                  <a:schemeClr val="dk1"/>
+                </a:solidFill>
+              </a:rPr>
+              <a:t>Use built in spark tools (MapReduce, k-means) for model pipeline</a:t>
+            </a:r>
+            <a:endParaRPr>
+              <a:solidFill>
+                <a:schemeClr val="dk1"/>
+              </a:solidFill>
+            </a:endParaRPr>
+          </a:p>
+          <a:p>
+            <a:pPr marL="457200" lvl="0" indent="-317500" algn="l" rtl="0">
+              <a:lnSpc>
+                <a:spcPct val="95000"/>
+              </a:lnSpc>
+              <a:spcBef>
+                <a:spcPts val="0"/>
+              </a:spcBef>
+              <a:spcAft>
+                <a:spcPts val="0"/>
+              </a:spcAft>
+              <a:buClr>
+                <a:schemeClr val="dk1"/>
+              </a:buClr>
+              <a:buSzPts val="1400"/>
+              <a:buChar char="●"/>
+            </a:pPr>
+            <a:r>
+              <a:rPr lang="en-US">
+                <a:solidFill>
+                  <a:schemeClr val="dk1"/>
+                </a:solidFill>
+              </a:rPr>
+              <a:t>GitHub</a:t>
+            </a:r>
+            <a:endParaRPr>
+              <a:solidFill>
+                <a:schemeClr val="dk1"/>
+              </a:solidFill>
+            </a:endParaRPr>
+          </a:p>
+          <a:p>
+            <a:pPr marL="914400" lvl="1" indent="-317500" algn="l" rtl="0">
+              <a:lnSpc>
+                <a:spcPct val="95000"/>
+              </a:lnSpc>
+              <a:spcBef>
+                <a:spcPts val="0"/>
+              </a:spcBef>
+              <a:spcAft>
+                <a:spcPts val="0"/>
+              </a:spcAft>
+              <a:buClr>
+                <a:schemeClr val="dk1"/>
+              </a:buClr>
+              <a:buSzPts val="1400"/>
+              <a:buChar char="○"/>
+            </a:pPr>
+            <a:r>
+              <a:rPr lang="en-US">
+                <a:solidFill>
+                  <a:schemeClr val="dk1"/>
+                </a:solidFill>
+              </a:rPr>
+              <a:t>Shared repository for collaboration among teammates</a:t>
+            </a:r>
+            <a:endParaRPr>
+              <a:solidFill>
+                <a:schemeClr val="dk1"/>
+              </a:solidFill>
+            </a:endParaRPr>
+          </a:p>
+          <a:p>
+            <a:pPr marL="914400" lvl="1" indent="-317500" algn="l" rtl="0">
+              <a:lnSpc>
+                <a:spcPct val="95000"/>
+              </a:lnSpc>
+              <a:spcBef>
+                <a:spcPts val="0"/>
+              </a:spcBef>
+              <a:spcAft>
+                <a:spcPts val="0"/>
+              </a:spcAft>
+              <a:buClr>
+                <a:schemeClr val="dk1"/>
+              </a:buClr>
+              <a:buSzPts val="1400"/>
+              <a:buChar char="○"/>
+            </a:pPr>
+            <a:r>
+              <a:rPr lang="en-US" u="sng">
                 <a:solidFill>
                   <a:schemeClr val="hlink"/>
                 </a:solidFill>
                 <a:hlinkClick r:id="rId4"/>
               </a:rPr>
-              <a:t>Automatic Musical Genre Classification Of Audio Signals</a:t>
+              <a:t>https://github.com/athornton1618/SpotifyClassifier</a:t>
             </a:r>
             <a:r>
-              <a:rPr lang="en-US" sz="1800">
+              <a:rPr lang="en-US">
                 <a:solidFill>
                   <a:schemeClr val="dk1"/>
                 </a:solidFill>
               </a:rPr>
-              <a:t> - Princeton CS dept </a:t>
+              <a:t> </a:t>
             </a:r>
-            <a:endParaRPr sz="1800">
+            <a:endParaRPr>
               <a:solidFill>
                 <a:schemeClr val="dk1"/>
               </a:solidFill>
@@ -9857,27 +10080,84 @@
               </a:spcAft>
               <a:buNone/>
             </a:pPr>
-            <a:endParaRPr sz="1800"/>
+            <a:endParaRPr sz="1500"/>
           </a:p>
         </p:txBody>
       </p:sp>
+      <p:pic>
+        <p:nvPicPr>
+          <p:cNvPr id="111" name="Google Shape;111;p18"/>
+          <p:cNvPicPr preferRelativeResize="0"/>
+          <p:nvPr/>
+        </p:nvPicPr>
+        <p:blipFill>
+          <a:blip r:embed="rId5">
+            <a:alphaModFix/>
+          </a:blip>
+          <a:stretch>
+            <a:fillRect/>
+          </a:stretch>
+        </p:blipFill>
+        <p:spPr>
+          <a:xfrm>
+            <a:off x="5517875" y="603575"/>
+            <a:ext cx="3510726" cy="1843131"/>
+          </a:xfrm>
+          <a:prstGeom prst="rect">
+            <a:avLst/>
+          </a:prstGeom>
+          <a:noFill/>
+          <a:ln>
+            <a:noFill/>
+          </a:ln>
+        </p:spPr>
+      </p:pic>
+      <p:pic>
+        <p:nvPicPr>
+          <p:cNvPr id="112" name="Google Shape;112;p18"/>
+          <p:cNvPicPr preferRelativeResize="0"/>
+          <p:nvPr/>
+        </p:nvPicPr>
+        <p:blipFill>
+          <a:blip r:embed="rId6">
+            <a:alphaModFix/>
+          </a:blip>
+          <a:stretch>
+            <a:fillRect/>
+          </a:stretch>
+        </p:blipFill>
+        <p:spPr>
+          <a:xfrm>
+            <a:off x="5670313" y="2310463"/>
+            <a:ext cx="1315876" cy="1315876"/>
+          </a:xfrm>
+          <a:prstGeom prst="rect">
+            <a:avLst/>
+          </a:prstGeom>
+          <a:noFill/>
+          <a:ln>
+            <a:noFill/>
+          </a:ln>
+        </p:spPr>
+      </p:pic>
       <p:pic>
         <p:nvPicPr>
           <p:cNvPr id="113" name="Google Shape;113;p18"/>
           <p:cNvPicPr preferRelativeResize="0"/>
           <p:nvPr/>
         </p:nvPicPr>
-        <p:blipFill rotWithShape="1">
-          <a:blip r:embed="rId5">
+        <p:blipFill>
+          <a:blip r:embed="rId7">
             <a:alphaModFix/>
           </a:blip>
-          <a:srcRect b="8875"/>
-          <a:stretch/>
+          <a:stretch>
+            <a:fillRect/>
+          </a:stretch>
         </p:blipFill>
         <p:spPr>
           <a:xfrm>
-            <a:off x="4842725" y="855900"/>
-            <a:ext cx="3833400" cy="2944125"/>
+            <a:off x="7280153" y="2529925"/>
+            <a:ext cx="1689246" cy="877000"/>
           </a:xfrm>
           <a:prstGeom prst="rect">
             <a:avLst/>
@@ -9896,8 +10176,8 @@
         </p:nvSpPr>
         <p:spPr>
           <a:xfrm>
-            <a:off x="5010275" y="3800025"/>
-            <a:ext cx="3498300" cy="615600"/>
+            <a:off x="5670313" y="3884300"/>
+            <a:ext cx="3303000" cy="400200"/>
           </a:xfrm>
           <a:prstGeom prst="rect">
             <a:avLst/>
@@ -9924,7 +10204,7 @@
             </a:pPr>
             <a:r>
               <a:rPr lang="en-US" i="1"/>
-              <a:t>Fig 3. Beat Histogram for Classical (Left) and Pop (Right) [1]</a:t>
+              <a:t>Fig 3. Tools (GCP, GitHub, Spark)</a:t>
             </a:r>
             <a:endParaRPr i="1"/>
           </a:p>
@@ -10050,6 +10330,430 @@
         </p:nvSpPr>
         <p:spPr>
           <a:xfrm>
+            <a:off x="247675" y="66600"/>
+            <a:ext cx="4593600" cy="692400"/>
+          </a:xfrm>
+          <a:prstGeom prst="rect">
+            <a:avLst/>
+          </a:prstGeom>
+          <a:noFill/>
+          <a:ln>
+            <a:noFill/>
+          </a:ln>
+        </p:spPr>
+        <p:txBody>
+          <a:bodyPr spcFirstLastPara="1" wrap="square" lIns="91425" tIns="45700" rIns="91425" bIns="45700" anchor="b" anchorCtr="0">
+            <a:noAutofit/>
+          </a:bodyPr>
+          <a:lstStyle/>
+          <a:p>
+            <a:pPr marL="0" lvl="0" indent="0" algn="l" rtl="0">
+              <a:lnSpc>
+                <a:spcPct val="100000"/>
+              </a:lnSpc>
+              <a:spcBef>
+                <a:spcPts val="0"/>
+              </a:spcBef>
+              <a:spcAft>
+                <a:spcPts val="0"/>
+              </a:spcAft>
+              <a:buClr>
+                <a:schemeClr val="dk1"/>
+              </a:buClr>
+              <a:buSzPts val="4400"/>
+              <a:buFont typeface="DecoType Naskh"/>
+              <a:buNone/>
+            </a:pPr>
+            <a:r>
+              <a:rPr lang="en-US" sz="3000"/>
+              <a:t>Reference Material</a:t>
+            </a:r>
+            <a:endParaRPr sz="3000"/>
+          </a:p>
+        </p:txBody>
+      </p:sp>
+      <p:sp>
+        <p:nvSpPr>
+          <p:cNvPr id="123" name="Google Shape;123;p19"/>
+          <p:cNvSpPr txBox="1"/>
+          <p:nvPr/>
+        </p:nvSpPr>
+        <p:spPr>
+          <a:xfrm>
+            <a:off x="247675" y="1150125"/>
+            <a:ext cx="4496100" cy="3285600"/>
+          </a:xfrm>
+          <a:prstGeom prst="rect">
+            <a:avLst/>
+          </a:prstGeom>
+          <a:noFill/>
+          <a:ln>
+            <a:noFill/>
+          </a:ln>
+        </p:spPr>
+        <p:txBody>
+          <a:bodyPr spcFirstLastPara="1" wrap="square" lIns="91425" tIns="91425" rIns="91425" bIns="91425" anchor="t" anchorCtr="0">
+            <a:noAutofit/>
+          </a:bodyPr>
+          <a:lstStyle/>
+          <a:p>
+            <a:pPr marL="0" lvl="0" indent="0" algn="l" rtl="0">
+              <a:lnSpc>
+                <a:spcPct val="95000"/>
+              </a:lnSpc>
+              <a:spcBef>
+                <a:spcPts val="0"/>
+              </a:spcBef>
+              <a:spcAft>
+                <a:spcPts val="0"/>
+              </a:spcAft>
+              <a:buNone/>
+            </a:pPr>
+            <a:r>
+              <a:rPr lang="en-US"/>
+              <a:t>[1]  </a:t>
+            </a:r>
+            <a:r>
+              <a:rPr lang="en-US" sz="1800" u="sng">
+                <a:solidFill>
+                  <a:schemeClr val="hlink"/>
+                </a:solidFill>
+                <a:hlinkClick r:id="rId4"/>
+              </a:rPr>
+              <a:t>Automatic Musical Genre Classification Of Audio Signals</a:t>
+            </a:r>
+            <a:r>
+              <a:rPr lang="en-US" sz="1800">
+                <a:solidFill>
+                  <a:schemeClr val="dk1"/>
+                </a:solidFill>
+              </a:rPr>
+              <a:t> - Princeton CS dept </a:t>
+            </a:r>
+            <a:endParaRPr sz="1800">
+              <a:solidFill>
+                <a:schemeClr val="dk1"/>
+              </a:solidFill>
+            </a:endParaRPr>
+          </a:p>
+          <a:p>
+            <a:pPr marL="0" lvl="0" indent="0" algn="l" rtl="0">
+              <a:lnSpc>
+                <a:spcPct val="95000"/>
+              </a:lnSpc>
+              <a:spcBef>
+                <a:spcPts val="600"/>
+              </a:spcBef>
+              <a:spcAft>
+                <a:spcPts val="0"/>
+              </a:spcAft>
+              <a:buNone/>
+            </a:pPr>
+            <a:endParaRPr sz="1800">
+              <a:solidFill>
+                <a:schemeClr val="dk1"/>
+              </a:solidFill>
+            </a:endParaRPr>
+          </a:p>
+          <a:p>
+            <a:pPr marL="457200" lvl="0" indent="-342900" algn="l" rtl="0">
+              <a:lnSpc>
+                <a:spcPct val="95000"/>
+              </a:lnSpc>
+              <a:spcBef>
+                <a:spcPts val="600"/>
+              </a:spcBef>
+              <a:spcAft>
+                <a:spcPts val="0"/>
+              </a:spcAft>
+              <a:buClr>
+                <a:schemeClr val="dk1"/>
+              </a:buClr>
+              <a:buSzPts val="1800"/>
+              <a:buChar char="●"/>
+            </a:pPr>
+            <a:r>
+              <a:rPr lang="en-US" sz="1800">
+                <a:solidFill>
+                  <a:schemeClr val="dk1"/>
+                </a:solidFill>
+              </a:rPr>
+              <a:t>Princeton research focused on DSP of raw audio</a:t>
+            </a:r>
+            <a:endParaRPr sz="1800">
+              <a:solidFill>
+                <a:schemeClr val="dk1"/>
+              </a:solidFill>
+            </a:endParaRPr>
+          </a:p>
+          <a:p>
+            <a:pPr marL="457200" lvl="0" indent="-342900" algn="l" rtl="0">
+              <a:lnSpc>
+                <a:spcPct val="95000"/>
+              </a:lnSpc>
+              <a:spcBef>
+                <a:spcPts val="0"/>
+              </a:spcBef>
+              <a:spcAft>
+                <a:spcPts val="0"/>
+              </a:spcAft>
+              <a:buClr>
+                <a:schemeClr val="dk1"/>
+              </a:buClr>
+              <a:buSzPts val="1800"/>
+              <a:buChar char="●"/>
+            </a:pPr>
+            <a:r>
+              <a:rPr lang="en-US" sz="1800">
+                <a:solidFill>
+                  <a:schemeClr val="dk1"/>
+                </a:solidFill>
+              </a:rPr>
+              <a:t>Spotify won't provide audio mp3's, only preprocessed metadata with features</a:t>
+            </a:r>
+            <a:endParaRPr sz="1800">
+              <a:solidFill>
+                <a:schemeClr val="dk1"/>
+              </a:solidFill>
+            </a:endParaRPr>
+          </a:p>
+          <a:p>
+            <a:pPr marL="457200" lvl="0" indent="-342900" algn="l" rtl="0">
+              <a:lnSpc>
+                <a:spcPct val="95000"/>
+              </a:lnSpc>
+              <a:spcBef>
+                <a:spcPts val="0"/>
+              </a:spcBef>
+              <a:spcAft>
+                <a:spcPts val="0"/>
+              </a:spcAft>
+              <a:buClr>
+                <a:schemeClr val="dk1"/>
+              </a:buClr>
+              <a:buSzPts val="1800"/>
+              <a:buChar char="●"/>
+            </a:pPr>
+            <a:r>
+              <a:rPr lang="en-US" sz="1800">
+                <a:solidFill>
+                  <a:schemeClr val="dk1"/>
+                </a:solidFill>
+              </a:rPr>
+              <a:t>Our project will scale for much larger song datasets</a:t>
+            </a:r>
+            <a:endParaRPr sz="1800">
+              <a:solidFill>
+                <a:schemeClr val="dk1"/>
+              </a:solidFill>
+            </a:endParaRPr>
+          </a:p>
+          <a:p>
+            <a:pPr marL="0" lvl="0" indent="0" algn="l" rtl="0">
+              <a:lnSpc>
+                <a:spcPct val="115000"/>
+              </a:lnSpc>
+              <a:spcBef>
+                <a:spcPts val="600"/>
+              </a:spcBef>
+              <a:spcAft>
+                <a:spcPts val="0"/>
+              </a:spcAft>
+              <a:buNone/>
+            </a:pPr>
+            <a:endParaRPr sz="1800"/>
+          </a:p>
+        </p:txBody>
+      </p:sp>
+      <p:pic>
+        <p:nvPicPr>
+          <p:cNvPr id="124" name="Google Shape;124;p19"/>
+          <p:cNvPicPr preferRelativeResize="0"/>
+          <p:nvPr/>
+        </p:nvPicPr>
+        <p:blipFill rotWithShape="1">
+          <a:blip r:embed="rId5">
+            <a:alphaModFix/>
+          </a:blip>
+          <a:srcRect b="8875"/>
+          <a:stretch/>
+        </p:blipFill>
+        <p:spPr>
+          <a:xfrm>
+            <a:off x="4842725" y="855900"/>
+            <a:ext cx="3833400" cy="2944125"/>
+          </a:xfrm>
+          <a:prstGeom prst="rect">
+            <a:avLst/>
+          </a:prstGeom>
+          <a:noFill/>
+          <a:ln>
+            <a:noFill/>
+          </a:ln>
+        </p:spPr>
+      </p:pic>
+      <p:sp>
+        <p:nvSpPr>
+          <p:cNvPr id="125" name="Google Shape;125;p19"/>
+          <p:cNvSpPr txBox="1"/>
+          <p:nvPr/>
+        </p:nvSpPr>
+        <p:spPr>
+          <a:xfrm>
+            <a:off x="5010275" y="3800025"/>
+            <a:ext cx="3498300" cy="615600"/>
+          </a:xfrm>
+          <a:prstGeom prst="rect">
+            <a:avLst/>
+          </a:prstGeom>
+          <a:noFill/>
+          <a:ln>
+            <a:noFill/>
+          </a:ln>
+        </p:spPr>
+        <p:txBody>
+          <a:bodyPr spcFirstLastPara="1" wrap="square" lIns="91425" tIns="91425" rIns="91425" bIns="91425" anchor="t" anchorCtr="0">
+            <a:spAutoFit/>
+          </a:bodyPr>
+          <a:lstStyle/>
+          <a:p>
+            <a:pPr marL="0" lvl="0" indent="0" algn="ctr" rtl="0">
+              <a:spcBef>
+                <a:spcPts val="0"/>
+              </a:spcBef>
+              <a:spcAft>
+                <a:spcPts val="0"/>
+              </a:spcAft>
+              <a:buNone/>
+            </a:pPr>
+            <a:r>
+              <a:rPr lang="en-US" i="1"/>
+              <a:t>Fig 4. Beat Histogram for Classical (Left) and Pop (Right) [1]</a:t>
+            </a:r>
+            <a:endParaRPr i="1"/>
+          </a:p>
+        </p:txBody>
+      </p:sp>
+    </p:spTree>
+  </p:cSld>
+  <p:clrMapOvr>
+    <a:masterClrMapping/>
+  </p:clrMapOvr>
+</p:sld>
+</file>
+
+<file path=ppt/slides/slide7.xml><?xml version="1.0" encoding="utf-8"?>
+<p:sld xmlns:a="http://schemas.openxmlformats.org/drawingml/2006/main" xmlns:r="http://schemas.openxmlformats.org/officeDocument/2006/relationships" xmlns:p="http://schemas.openxmlformats.org/presentationml/2006/main">
+  <p:cSld>
+    <p:spTree>
+      <p:nvGrpSpPr>
+        <p:cNvPr id="1" name="Shape 129"/>
+        <p:cNvGrpSpPr/>
+        <p:nvPr/>
+      </p:nvGrpSpPr>
+      <p:grpSpPr>
+        <a:xfrm>
+          <a:off x="0" y="0"/>
+          <a:ext cx="0" cy="0"/>
+          <a:chOff x="0" y="0"/>
+          <a:chExt cx="0" cy="0"/>
+        </a:xfrm>
+      </p:grpSpPr>
+      <p:grpSp>
+        <p:nvGrpSpPr>
+          <p:cNvPr id="130" name="Google Shape;130;p20"/>
+          <p:cNvGrpSpPr/>
+          <p:nvPr/>
+        </p:nvGrpSpPr>
+        <p:grpSpPr>
+          <a:xfrm>
+            <a:off x="-150" y="4761900"/>
+            <a:ext cx="9144000" cy="381600"/>
+            <a:chOff x="-150" y="4761900"/>
+            <a:chExt cx="9144000" cy="381600"/>
+          </a:xfrm>
+        </p:grpSpPr>
+        <p:sp>
+          <p:nvSpPr>
+            <p:cNvPr id="131" name="Google Shape;131;p20"/>
+            <p:cNvSpPr/>
+            <p:nvPr/>
+          </p:nvSpPr>
+          <p:spPr>
+            <a:xfrm>
+              <a:off x="-150" y="4761900"/>
+              <a:ext cx="9144000" cy="381600"/>
+            </a:xfrm>
+            <a:prstGeom prst="rect">
+              <a:avLst/>
+            </a:prstGeom>
+            <a:solidFill>
+              <a:srgbClr val="002060"/>
+            </a:solidFill>
+            <a:ln>
+              <a:noFill/>
+            </a:ln>
+          </p:spPr>
+          <p:txBody>
+            <a:bodyPr spcFirstLastPara="1" wrap="square" lIns="91425" tIns="91425" rIns="91425" bIns="91425" anchor="ctr" anchorCtr="0">
+              <a:noAutofit/>
+            </a:bodyPr>
+            <a:lstStyle/>
+            <a:p>
+              <a:pPr marL="0" lvl="0" indent="0" algn="l" rtl="0">
+                <a:spcBef>
+                  <a:spcPts val="0"/>
+                </a:spcBef>
+                <a:spcAft>
+                  <a:spcPts val="0"/>
+                </a:spcAft>
+                <a:buNone/>
+              </a:pPr>
+              <a:endParaRPr/>
+            </a:p>
+          </p:txBody>
+        </p:sp>
+        <p:pic>
+          <p:nvPicPr>
+            <p:cNvPr id="132" name="Google Shape;132;p20"/>
+            <p:cNvPicPr preferRelativeResize="0"/>
+            <p:nvPr/>
+          </p:nvPicPr>
+          <p:blipFill>
+            <a:blip r:embed="rId3">
+              <a:alphaModFix/>
+            </a:blip>
+            <a:stretch>
+              <a:fillRect/>
+            </a:stretch>
+          </p:blipFill>
+          <p:spPr>
+            <a:xfrm>
+              <a:off x="84625" y="4830825"/>
+              <a:ext cx="1997205" cy="243750"/>
+            </a:xfrm>
+            <a:prstGeom prst="rect">
+              <a:avLst/>
+            </a:prstGeom>
+            <a:noFill/>
+            <a:ln>
+              <a:noFill/>
+            </a:ln>
+          </p:spPr>
+        </p:pic>
+      </p:grpSp>
+      <p:sp>
+        <p:nvSpPr>
+          <p:cNvPr id="133" name="Google Shape;133;p20"/>
+          <p:cNvSpPr txBox="1">
+            <a:spLocks noGrp="1"/>
+          </p:cNvSpPr>
+          <p:nvPr>
+            <p:ph type="title"/>
+          </p:nvPr>
+        </p:nvSpPr>
+        <p:spPr>
+          <a:xfrm>
             <a:off x="195900" y="66600"/>
             <a:ext cx="8791200" cy="692400"/>
           </a:xfrm>
@@ -10094,33 +10798,40 @@
       </p:sp>
       <p:graphicFrame>
         <p:nvGraphicFramePr>
-          <p:cNvPr id="123" name="Google Shape;123;p19"/>
+          <p:cNvPr id="134" name="Google Shape;134;p20"/>
           <p:cNvGraphicFramePr/>
           <p:nvPr/>
         </p:nvGraphicFramePr>
         <p:xfrm>
           <a:off x="195963" y="820067"/>
-          <a:ext cx="3000000" cy="3000000"/>
+          <a:ext cx="8791100" cy="3892600"/>
         </p:xfrm>
         <a:graphic>
           <a:graphicData uri="http://schemas.openxmlformats.org/drawingml/2006/table">
             <a:tbl>
               <a:tblPr>
                 <a:noFill/>
-                <a:tableStyleId>{C9C6E810-86AB-4760-A13B-4768EDD96E78}</a:tableStyleId>
+                <a:tableStyleId>{82DEFA20-D2A7-4BC1-9443-CBB098B25907}</a:tableStyleId>
               </a:tblPr>
               <a:tblGrid>
-                <a:gridCol w="855975">
+                <a:gridCol w="982750">
                   <a:extLst>
                     <a:ext uri="{9D8B030D-6E8A-4147-A177-3AD203B41FA5}">
                       <a16:colId xmlns:a16="http://schemas.microsoft.com/office/drawing/2014/main" val="20000"/>
                     </a:ext>
                   </a:extLst>
                 </a:gridCol>
-                <a:gridCol w="7935100">
+                <a:gridCol w="6005975">
                   <a:extLst>
                     <a:ext uri="{9D8B030D-6E8A-4147-A177-3AD203B41FA5}">
                       <a16:colId xmlns:a16="http://schemas.microsoft.com/office/drawing/2014/main" val="20001"/>
+                    </a:ext>
+                  </a:extLst>
+                </a:gridCol>
+                <a:gridCol w="1802375">
+                  <a:extLst>
+                    <a:ext uri="{9D8B030D-6E8A-4147-A177-3AD203B41FA5}">
+                      <a16:colId xmlns:a16="http://schemas.microsoft.com/office/drawing/2014/main" val="20002"/>
                     </a:ext>
                   </a:extLst>
                 </a:gridCol>
@@ -10141,10 +10852,10 @@
                         <a:buNone/>
                       </a:pPr>
                       <a:r>
-                        <a:rPr lang="en-US"/>
+                        <a:rPr lang="en-US" sz="1100"/>
                         <a:t>11/05</a:t>
                       </a:r>
-                      <a:endParaRPr/>
+                      <a:endParaRPr sz="1100"/>
                     </a:p>
                   </a:txBody>
                   <a:tcPr marL="91425" marR="91425" marT="91425" marB="91425"/>
@@ -10164,10 +10875,33 @@
                         <a:buNone/>
                       </a:pPr>
                       <a:r>
-                        <a:rPr lang="en-US"/>
+                        <a:rPr lang="en-US" sz="1100"/>
                         <a:t>Proposal Presentation (Today)</a:t>
                       </a:r>
-                      <a:endParaRPr/>
+                      <a:endParaRPr sz="1100"/>
+                    </a:p>
+                  </a:txBody>
+                  <a:tcPr marL="91425" marR="91425" marT="91425" marB="91425"/>
+                </a:tc>
+                <a:tc>
+                  <a:txBody>
+                    <a:bodyPr/>
+                    <a:lstStyle/>
+                    <a:p>
+                      <a:pPr marL="0" lvl="0" indent="0" algn="l" rtl="0">
+                        <a:spcBef>
+                          <a:spcPts val="0"/>
+                        </a:spcBef>
+                        <a:spcAft>
+                          <a:spcPts val="0"/>
+                        </a:spcAft>
+                        <a:buNone/>
+                      </a:pPr>
+                      <a:r>
+                        <a:rPr lang="en-US" sz="1100"/>
+                        <a:t>Everyone</a:t>
+                      </a:r>
+                      <a:endParaRPr sz="1100"/>
                     </a:p>
                   </a:txBody>
                   <a:tcPr marL="91425" marR="91425" marT="91425" marB="91425"/>
@@ -10194,10 +10928,10 @@
                         <a:buNone/>
                       </a:pPr>
                       <a:r>
-                        <a:rPr lang="en-US"/>
+                        <a:rPr lang="en-US" sz="1100"/>
                         <a:t>11/14</a:t>
                       </a:r>
-                      <a:endParaRPr/>
+                      <a:endParaRPr sz="1100"/>
                     </a:p>
                   </a:txBody>
                   <a:tcPr marL="91425" marR="91425" marT="91425" marB="91425"/>
@@ -10217,10 +10951,33 @@
                         <a:buNone/>
                       </a:pPr>
                       <a:r>
-                        <a:rPr lang="en-US"/>
-                        <a:t>Initial Progress Checkpoint (API keys, pulled sample mp3 snippet, stored in BQ)</a:t>
+                        <a:rPr lang="en-US" sz="1100"/>
+                        <a:t>Initial Progress Checkpoint (API keys, sample song metadata json stored in dataproc)</a:t>
                       </a:r>
-                      <a:endParaRPr/>
+                      <a:endParaRPr sz="1100"/>
+                    </a:p>
+                  </a:txBody>
+                  <a:tcPr marL="91425" marR="91425" marT="91425" marB="91425"/>
+                </a:tc>
+                <a:tc>
+                  <a:txBody>
+                    <a:bodyPr/>
+                    <a:lstStyle/>
+                    <a:p>
+                      <a:pPr marL="0" lvl="0" indent="0" algn="l" rtl="0">
+                        <a:spcBef>
+                          <a:spcPts val="0"/>
+                        </a:spcBef>
+                        <a:spcAft>
+                          <a:spcPts val="0"/>
+                        </a:spcAft>
+                        <a:buNone/>
+                      </a:pPr>
+                      <a:r>
+                        <a:rPr lang="en-US" sz="1100"/>
+                        <a:t>Alex</a:t>
+                      </a:r>
+                      <a:endParaRPr sz="1100"/>
                     </a:p>
                   </a:txBody>
                   <a:tcPr marL="91425" marR="91425" marT="91425" marB="91425"/>
@@ -10247,10 +11004,10 @@
                         <a:buNone/>
                       </a:pPr>
                       <a:r>
-                        <a:rPr lang="en-US"/>
+                        <a:rPr lang="en-US" sz="1100"/>
                         <a:t>11/19</a:t>
                       </a:r>
-                      <a:endParaRPr/>
+                      <a:endParaRPr sz="1100"/>
                     </a:p>
                   </a:txBody>
                   <a:tcPr marL="91425" marR="91425" marT="91425" marB="91425"/>
@@ -10270,10 +11027,33 @@
                         <a:buNone/>
                       </a:pPr>
                       <a:r>
-                        <a:rPr lang="en-US"/>
+                        <a:rPr lang="en-US" sz="1100"/>
                         <a:t>Progress Presentation</a:t>
                       </a:r>
-                      <a:endParaRPr/>
+                      <a:endParaRPr sz="1100"/>
+                    </a:p>
+                  </a:txBody>
+                  <a:tcPr marL="91425" marR="91425" marT="91425" marB="91425"/>
+                </a:tc>
+                <a:tc>
+                  <a:txBody>
+                    <a:bodyPr/>
+                    <a:lstStyle/>
+                    <a:p>
+                      <a:pPr marL="0" lvl="0" indent="0" algn="l" rtl="0">
+                        <a:spcBef>
+                          <a:spcPts val="0"/>
+                        </a:spcBef>
+                        <a:spcAft>
+                          <a:spcPts val="0"/>
+                        </a:spcAft>
+                        <a:buNone/>
+                      </a:pPr>
+                      <a:r>
+                        <a:rPr lang="en-US" sz="1100"/>
+                        <a:t>Everyone</a:t>
+                      </a:r>
+                      <a:endParaRPr sz="1100"/>
                     </a:p>
                   </a:txBody>
                   <a:tcPr marL="91425" marR="91425" marT="91425" marB="91425"/>
@@ -10300,10 +11080,10 @@
                         <a:buNone/>
                       </a:pPr>
                       <a:r>
-                        <a:rPr lang="en-US"/>
+                        <a:rPr lang="en-US" sz="1100"/>
                         <a:t>11/28</a:t>
                       </a:r>
-                      <a:endParaRPr/>
+                      <a:endParaRPr sz="1100"/>
                     </a:p>
                   </a:txBody>
                   <a:tcPr marL="91425" marR="91425" marT="91425" marB="91425"/>
@@ -10323,10 +11103,165 @@
                         <a:buNone/>
                       </a:pPr>
                       <a:r>
-                        <a:rPr lang="en-US"/>
-                        <a:t>Prototypes of all 3 scripts (data collection, DSP, model)</a:t>
+                        <a:rPr lang="en-US" sz="1100"/>
+                        <a:t>Minimum Viable Product (product owners listed)</a:t>
                       </a:r>
-                      <a:endParaRPr/>
+                      <a:endParaRPr sz="1100"/>
+                    </a:p>
+                    <a:p>
+                      <a:pPr marL="457200" lvl="0" indent="-298450" algn="l" rtl="0">
+                        <a:spcBef>
+                          <a:spcPts val="0"/>
+                        </a:spcBef>
+                        <a:spcAft>
+                          <a:spcPts val="0"/>
+                        </a:spcAft>
+                        <a:buSzPts val="1100"/>
+                        <a:buAutoNum type="arabicPeriod"/>
+                      </a:pPr>
+                      <a:r>
+                        <a:rPr lang="en-US" sz="1100"/>
+                        <a:t>Data collection</a:t>
+                      </a:r>
+                      <a:endParaRPr sz="1100"/>
+                    </a:p>
+                    <a:p>
+                      <a:pPr marL="457200" lvl="0" indent="-298450" algn="l" rtl="0">
+                        <a:spcBef>
+                          <a:spcPts val="0"/>
+                        </a:spcBef>
+                        <a:spcAft>
+                          <a:spcPts val="0"/>
+                        </a:spcAft>
+                        <a:buSzPts val="1100"/>
+                        <a:buAutoNum type="arabicPeriod"/>
+                      </a:pPr>
+                      <a:r>
+                        <a:rPr lang="en-US" sz="1100"/>
+                        <a:t>Song vectorization + processing</a:t>
+                      </a:r>
+                      <a:endParaRPr sz="1100"/>
+                    </a:p>
+                    <a:p>
+                      <a:pPr marL="457200" lvl="0" indent="-298450" algn="l" rtl="0">
+                        <a:spcBef>
+                          <a:spcPts val="0"/>
+                        </a:spcBef>
+                        <a:spcAft>
+                          <a:spcPts val="0"/>
+                        </a:spcAft>
+                        <a:buSzPts val="1100"/>
+                        <a:buAutoNum type="arabicPeriod"/>
+                      </a:pPr>
+                      <a:r>
+                        <a:rPr lang="en-US" sz="1100"/>
+                        <a:t>K-means model</a:t>
+                      </a:r>
+                      <a:endParaRPr sz="1100"/>
+                    </a:p>
+                    <a:p>
+                      <a:pPr marL="457200" lvl="0" indent="-298450" algn="l" rtl="0">
+                        <a:spcBef>
+                          <a:spcPts val="0"/>
+                        </a:spcBef>
+                        <a:spcAft>
+                          <a:spcPts val="0"/>
+                        </a:spcAft>
+                        <a:buSzPts val="1100"/>
+                        <a:buAutoNum type="arabicPeriod"/>
+                      </a:pPr>
+                      <a:r>
+                        <a:rPr lang="en-US" sz="1100"/>
+                        <a:t>Analysis + Visualization</a:t>
+                      </a:r>
+                      <a:endParaRPr sz="1100"/>
+                    </a:p>
+                  </a:txBody>
+                  <a:tcPr marL="91425" marR="91425" marT="91425" marB="91425"/>
+                </a:tc>
+                <a:tc>
+                  <a:txBody>
+                    <a:bodyPr/>
+                    <a:lstStyle/>
+                    <a:p>
+                      <a:pPr marL="0" lvl="0" indent="0" algn="l" rtl="0">
+                        <a:spcBef>
+                          <a:spcPts val="0"/>
+                        </a:spcBef>
+                        <a:spcAft>
+                          <a:spcPts val="0"/>
+                        </a:spcAft>
+                        <a:buNone/>
+                      </a:pPr>
+                      <a:endParaRPr sz="1100"/>
+                    </a:p>
+                    <a:p>
+                      <a:pPr marL="457200" lvl="0" indent="-298450" algn="l" rtl="0">
+                        <a:spcBef>
+                          <a:spcPts val="0"/>
+                        </a:spcBef>
+                        <a:spcAft>
+                          <a:spcPts val="0"/>
+                        </a:spcAft>
+                        <a:buSzPts val="1100"/>
+                        <a:buAutoNum type="arabicPeriod"/>
+                      </a:pPr>
+                      <a:r>
+                        <a:rPr lang="en-US" sz="1100"/>
+                        <a:t>Alex</a:t>
+                      </a:r>
+                      <a:endParaRPr sz="1100"/>
+                    </a:p>
+                    <a:p>
+                      <a:pPr marL="457200" lvl="0" indent="-298450" algn="l" rtl="0">
+                        <a:spcBef>
+                          <a:spcPts val="0"/>
+                        </a:spcBef>
+                        <a:spcAft>
+                          <a:spcPts val="0"/>
+                        </a:spcAft>
+                        <a:buSzPts val="1100"/>
+                        <a:buAutoNum type="arabicPeriod"/>
+                      </a:pPr>
+                      <a:r>
+                        <a:rPr lang="en-US" sz="1100"/>
+                        <a:t>Tanvi</a:t>
+                      </a:r>
+                      <a:endParaRPr sz="1100"/>
+                    </a:p>
+                    <a:p>
+                      <a:pPr marL="457200" lvl="0" indent="-298450" algn="l" rtl="0">
+                        <a:spcBef>
+                          <a:spcPts val="0"/>
+                        </a:spcBef>
+                        <a:spcAft>
+                          <a:spcPts val="0"/>
+                        </a:spcAft>
+                        <a:buSzPts val="1100"/>
+                        <a:buAutoNum type="arabicPeriod"/>
+                      </a:pPr>
+                      <a:r>
+                        <a:rPr lang="en-US" sz="1100"/>
+                        <a:t>Elmira</a:t>
+                      </a:r>
+                      <a:endParaRPr sz="1100"/>
+                    </a:p>
+                    <a:p>
+                      <a:pPr marL="457200" lvl="0" indent="-298450" algn="l" rtl="0">
+                        <a:spcBef>
+                          <a:spcPts val="0"/>
+                        </a:spcBef>
+                        <a:spcAft>
+                          <a:spcPts val="0"/>
+                        </a:spcAft>
+                        <a:buSzPts val="1100"/>
+                        <a:buAutoNum type="arabicPeriod"/>
+                      </a:pPr>
+                      <a:r>
+                        <a:rPr lang="en-US" sz="1100"/>
+                        <a:t>Everyone</a:t>
+                      </a:r>
+                      <a:endParaRPr sz="1100"/>
                     </a:p>
                   </a:txBody>
                   <a:tcPr marL="91425" marR="91425" marT="91425" marB="91425"/>
@@ -10353,10 +11288,10 @@
                         <a:buNone/>
                       </a:pPr>
                       <a:r>
-                        <a:rPr lang="en-US"/>
+                        <a:rPr lang="en-US" sz="1100"/>
                         <a:t>12/03</a:t>
                       </a:r>
-                      <a:endParaRPr/>
+                      <a:endParaRPr sz="1100"/>
                     </a:p>
                   </a:txBody>
                   <a:tcPr marL="91425" marR="91425" marT="91425" marB="91425"/>
@@ -10376,10 +11311,33 @@
                         <a:buNone/>
                       </a:pPr>
                       <a:r>
-                        <a:rPr lang="en-US"/>
+                        <a:rPr lang="en-US" sz="1100"/>
                         <a:t>Progress Report</a:t>
                       </a:r>
-                      <a:endParaRPr/>
+                      <a:endParaRPr sz="1100"/>
+                    </a:p>
+                  </a:txBody>
+                  <a:tcPr marL="91425" marR="91425" marT="91425" marB="91425"/>
+                </a:tc>
+                <a:tc>
+                  <a:txBody>
+                    <a:bodyPr/>
+                    <a:lstStyle/>
+                    <a:p>
+                      <a:pPr marL="0" lvl="0" indent="0" algn="l" rtl="0">
+                        <a:spcBef>
+                          <a:spcPts val="0"/>
+                        </a:spcBef>
+                        <a:spcAft>
+                          <a:spcPts val="0"/>
+                        </a:spcAft>
+                        <a:buNone/>
+                      </a:pPr>
+                      <a:r>
+                        <a:rPr lang="en-US" sz="1100"/>
+                        <a:t>Everyone</a:t>
+                      </a:r>
+                      <a:endParaRPr sz="1100"/>
                     </a:p>
                   </a:txBody>
                   <a:tcPr marL="91425" marR="91425" marT="91425" marB="91425"/>
@@ -10406,10 +11364,10 @@
                         <a:buNone/>
                       </a:pPr>
                       <a:r>
-                        <a:rPr lang="en-US"/>
+                        <a:rPr lang="en-US" sz="1100"/>
                         <a:t>12/05</a:t>
                       </a:r>
-                      <a:endParaRPr/>
+                      <a:endParaRPr sz="1100"/>
                     </a:p>
                   </a:txBody>
                   <a:tcPr marL="91425" marR="91425" marT="91425" marB="91425"/>
@@ -10429,10 +11387,33 @@
                         <a:buNone/>
                       </a:pPr>
                       <a:r>
-                        <a:rPr lang="en-US"/>
+                        <a:rPr lang="en-US" sz="1100"/>
                         <a:t>Completion of all scripts, model trained, verification</a:t>
                       </a:r>
-                      <a:endParaRPr/>
+                      <a:endParaRPr sz="1100"/>
+                    </a:p>
+                  </a:txBody>
+                  <a:tcPr marL="91425" marR="91425" marT="91425" marB="91425"/>
+                </a:tc>
+                <a:tc>
+                  <a:txBody>
+                    <a:bodyPr/>
+                    <a:lstStyle/>
+                    <a:p>
+                      <a:pPr marL="0" lvl="0" indent="0" algn="l" rtl="0">
+                        <a:spcBef>
+                          <a:spcPts val="0"/>
+                        </a:spcBef>
+                        <a:spcAft>
+                          <a:spcPts val="0"/>
+                        </a:spcAft>
+                        <a:buNone/>
+                      </a:pPr>
+                      <a:r>
+                        <a:rPr lang="en-US" sz="1100"/>
+                        <a:t>Everyone</a:t>
+                      </a:r>
+                      <a:endParaRPr sz="1100"/>
                     </a:p>
                   </a:txBody>
                   <a:tcPr marL="91425" marR="91425" marT="91425" marB="91425"/>
@@ -10459,10 +11440,10 @@
                         <a:buNone/>
                       </a:pPr>
                       <a:r>
-                        <a:rPr lang="en-US"/>
+                        <a:rPr lang="en-US" sz="1100"/>
                         <a:t>12/17</a:t>
                       </a:r>
-                      <a:endParaRPr/>
+                      <a:endParaRPr sz="1100"/>
                     </a:p>
                   </a:txBody>
                   <a:tcPr marL="91425" marR="91425" marT="91425" marB="91425"/>
@@ -10482,10 +11463,33 @@
                         <a:buNone/>
                       </a:pPr>
                       <a:r>
-                        <a:rPr lang="en-US"/>
+                        <a:rPr lang="en-US" sz="1100"/>
                         <a:t>Final Slides Submission</a:t>
                       </a:r>
-                      <a:endParaRPr/>
+                      <a:endParaRPr sz="1100"/>
+                    </a:p>
+                  </a:txBody>
+                  <a:tcPr marL="91425" marR="91425" marT="91425" marB="91425"/>
+                </a:tc>
+                <a:tc>
+                  <a:txBody>
+                    <a:bodyPr/>
+                    <a:lstStyle/>
+                    <a:p>
+                      <a:pPr marL="0" lvl="0" indent="0" algn="l" rtl="0">
+                        <a:spcBef>
+                          <a:spcPts val="0"/>
+                        </a:spcBef>
+                        <a:spcAft>
+                          <a:spcPts val="0"/>
+                        </a:spcAft>
+                        <a:buNone/>
+                      </a:pPr>
+                      <a:r>
+                        <a:rPr lang="en-US" sz="1100"/>
+                        <a:t>Everyone</a:t>
+                      </a:r>
+                      <a:endParaRPr sz="1100"/>
                     </a:p>
                   </a:txBody>
                   <a:tcPr marL="91425" marR="91425" marT="91425" marB="91425"/>

</xml_diff>

<commit_message>
Finishing touches on proposal
</commit_message>
<xml_diff>
--- a/Documentation/Spotify Classifier Proposal.pptx
+++ b/Documentation/Spotify Classifier Proposal.pptx
@@ -9010,8 +9010,8 @@
         </p:nvSpPr>
         <p:spPr>
           <a:xfrm>
-            <a:off x="247675" y="1150125"/>
-            <a:ext cx="4251600" cy="3285600"/>
+            <a:off x="247674" y="1150125"/>
+            <a:ext cx="4524559" cy="3285600"/>
           </a:xfrm>
           <a:prstGeom prst="rect">
             <a:avLst/>
@@ -9044,14 +9044,14 @@
               <a:buChar char="●"/>
             </a:pPr>
             <a:r>
-              <a:rPr lang="en-US" sz="1800" b="1">
+              <a:rPr lang="en-US" sz="1800" b="1" dirty="0">
                 <a:solidFill>
                   <a:schemeClr val="dk1"/>
                 </a:solidFill>
               </a:rPr>
               <a:t>Volume</a:t>
             </a:r>
-            <a:endParaRPr sz="1800" b="1">
+            <a:endParaRPr sz="1800" b="1" dirty="0">
               <a:solidFill>
                 <a:schemeClr val="dk1"/>
               </a:solidFill>
@@ -9075,14 +9075,14 @@
               <a:buChar char="○"/>
             </a:pPr>
             <a:r>
-              <a:rPr lang="en-US" sz="1800">
+              <a:rPr lang="en-US" sz="1800" dirty="0">
                 <a:solidFill>
                   <a:schemeClr val="dk1"/>
                 </a:solidFill>
               </a:rPr>
               <a:t>10,000+ songs will be processed</a:t>
             </a:r>
-            <a:endParaRPr sz="1800">
+            <a:endParaRPr sz="1800" dirty="0">
               <a:solidFill>
                 <a:schemeClr val="dk1"/>
               </a:solidFill>
@@ -9106,14 +9106,14 @@
               <a:buChar char="●"/>
             </a:pPr>
             <a:r>
-              <a:rPr lang="en-US" sz="1800" b="1">
+              <a:rPr lang="en-US" sz="1800" b="1" dirty="0">
                 <a:solidFill>
                   <a:schemeClr val="dk1"/>
                 </a:solidFill>
               </a:rPr>
               <a:t>Variety</a:t>
             </a:r>
-            <a:endParaRPr sz="1800" b="1">
+            <a:endParaRPr sz="1800" b="1" dirty="0">
               <a:solidFill>
                 <a:schemeClr val="dk1"/>
               </a:solidFill>
@@ -9137,14 +9137,14 @@
               <a:buChar char="○"/>
             </a:pPr>
             <a:r>
-              <a:rPr lang="en-US" sz="1800">
+              <a:rPr lang="en-US" sz="1800" dirty="0">
                 <a:solidFill>
                   <a:schemeClr val="dk1"/>
                 </a:solidFill>
               </a:rPr>
               <a:t>All song metadata structured in json format</a:t>
             </a:r>
-            <a:endParaRPr sz="1800">
+            <a:endParaRPr sz="1800" dirty="0">
               <a:solidFill>
                 <a:schemeClr val="dk1"/>
               </a:solidFill>
@@ -9168,14 +9168,14 @@
               <a:buChar char="●"/>
             </a:pPr>
             <a:r>
-              <a:rPr lang="en-US" sz="1800" b="1">
+              <a:rPr lang="en-US" sz="1800" b="1" dirty="0">
                 <a:solidFill>
                   <a:schemeClr val="dk1"/>
                 </a:solidFill>
               </a:rPr>
               <a:t>Velocity</a:t>
             </a:r>
-            <a:endParaRPr sz="1800" b="1">
+            <a:endParaRPr sz="1800" b="1" dirty="0">
               <a:solidFill>
                 <a:schemeClr val="dk1"/>
               </a:solidFill>
@@ -9199,14 +9199,40 @@
               <a:buChar char="○"/>
             </a:pPr>
             <a:r>
-              <a:rPr lang="en-US" sz="1800">
+              <a:rPr lang="en-US" sz="1800" dirty="0">
                 <a:solidFill>
                   <a:schemeClr val="dk1"/>
                 </a:solidFill>
               </a:rPr>
-              <a:t>Data not time sensitive</a:t>
+              <a:t>Data not time sensitive/ streamed</a:t>
             </a:r>
-            <a:endParaRPr sz="1800">
+          </a:p>
+          <a:p>
+            <a:pPr marL="914400" lvl="1" indent="-342900" algn="l" rtl="0">
+              <a:lnSpc>
+                <a:spcPct val="95000"/>
+              </a:lnSpc>
+              <a:spcBef>
+                <a:spcPts val="0"/>
+              </a:spcBef>
+              <a:spcAft>
+                <a:spcPts val="0"/>
+              </a:spcAft>
+              <a:buClr>
+                <a:schemeClr val="dk1"/>
+              </a:buClr>
+              <a:buSzPts val="1800"/>
+              <a:buChar char="○"/>
+            </a:pPr>
+            <a:r>
+              <a:rPr lang="en-US" sz="1800" dirty="0">
+                <a:solidFill>
+                  <a:schemeClr val="dk1"/>
+                </a:solidFill>
+              </a:rPr>
+              <a:t>Spotify queried for song metadata in batches by genre</a:t>
+            </a:r>
+            <a:endParaRPr sz="1800" dirty="0">
               <a:solidFill>
                 <a:schemeClr val="dk1"/>
               </a:solidFill>
@@ -9225,7 +9251,7 @@
               </a:spcAft>
               <a:buNone/>
             </a:pPr>
-            <a:endParaRPr sz="1800"/>
+            <a:endParaRPr sz="1800" dirty="0"/>
           </a:p>
         </p:txBody>
       </p:sp>
@@ -9237,7 +9263,7 @@
         </p:nvSpPr>
         <p:spPr>
           <a:xfrm>
-            <a:off x="5021875" y="3940650"/>
+            <a:off x="5118274" y="3922962"/>
             <a:ext cx="3479400" cy="400200"/>
           </a:xfrm>
           <a:prstGeom prst="rect">
@@ -9264,10 +9290,10 @@
               <a:buNone/>
             </a:pPr>
             <a:r>
-              <a:rPr lang="en-US" i="1"/>
+              <a:rPr lang="en-US" i="1" dirty="0"/>
               <a:t>Fig 2. Song metadata</a:t>
             </a:r>
-            <a:endParaRPr i="1"/>
+            <a:endParaRPr i="1" dirty="0"/>
           </a:p>
         </p:txBody>
       </p:sp>
@@ -9505,30 +9531,32 @@
       </p:sp>
       <p:pic>
         <p:nvPicPr>
-          <p:cNvPr id="101" name="Google Shape;101;p17"/>
-          <p:cNvPicPr preferRelativeResize="0"/>
+          <p:cNvPr id="3" name="Picture 2">
+            <a:extLst>
+              <a:ext uri="{FF2B5EF4-FFF2-40B4-BE49-F238E27FC236}">
+                <a16:creationId xmlns:a16="http://schemas.microsoft.com/office/drawing/2014/main" id="{3F13A1D5-89B9-4810-934A-ACAA57436244}"/>
+              </a:ext>
+            </a:extLst>
+          </p:cNvPr>
+          <p:cNvPicPr>
+            <a:picLocks noChangeAspect="1"/>
+          </p:cNvPicPr>
           <p:nvPr/>
         </p:nvPicPr>
         <p:blipFill>
-          <a:blip r:embed="rId4">
-            <a:alphaModFix/>
-          </a:blip>
+          <a:blip r:embed="rId4"/>
           <a:stretch>
             <a:fillRect/>
           </a:stretch>
         </p:blipFill>
         <p:spPr>
           <a:xfrm>
-            <a:off x="622380" y="911400"/>
-            <a:ext cx="7898945" cy="3047050"/>
+            <a:off x="787585" y="917830"/>
+            <a:ext cx="7703602" cy="2971695"/>
           </a:xfrm>
           <a:prstGeom prst="rect">
             <a:avLst/>
           </a:prstGeom>
-          <a:noFill/>
-          <a:ln>
-            <a:noFill/>
-          </a:ln>
         </p:spPr>
       </p:pic>
     </p:spTree>

</xml_diff>

<commit_message>
more finishing touches on proposal
</commit_message>
<xml_diff>
--- a/Documentation/Spotify Classifier Proposal.pptx
+++ b/Documentation/Spotify Classifier Proposal.pptx
@@ -8629,10 +8629,10 @@
               <a:buNone/>
             </a:pPr>
             <a:r>
-              <a:rPr lang="en-US" sz="3000"/>
+              <a:rPr lang="en-US" sz="3000" dirty="0"/>
               <a:t>Project Overview</a:t>
             </a:r>
-            <a:endParaRPr sz="3000"/>
+            <a:endParaRPr sz="3000" dirty="0"/>
           </a:p>
         </p:txBody>
       </p:sp>
@@ -8645,7 +8645,7 @@
         <p:spPr>
           <a:xfrm>
             <a:off x="247675" y="1150125"/>
-            <a:ext cx="4251600" cy="3285600"/>
+            <a:ext cx="4010626" cy="3285600"/>
           </a:xfrm>
           <a:prstGeom prst="rect">
             <a:avLst/>
@@ -8678,14 +8678,14 @@
               <a:buChar char="●"/>
             </a:pPr>
             <a:r>
-              <a:rPr lang="en-US" sz="1800">
+              <a:rPr lang="en-US" sz="1800" dirty="0">
                 <a:solidFill>
                   <a:schemeClr val="dk1"/>
                 </a:solidFill>
               </a:rPr>
-              <a:t>Seek to design and implement model for unsupervised music genre classification</a:t>
+              <a:t>Create model for unsupervised music genre classification</a:t>
             </a:r>
-            <a:endParaRPr sz="1800">
+            <a:endParaRPr sz="1800" dirty="0">
               <a:solidFill>
                 <a:schemeClr val="dk1"/>
               </a:solidFill>
@@ -8709,14 +8709,14 @@
               <a:buChar char="●"/>
             </a:pPr>
             <a:r>
-              <a:rPr lang="en-US" sz="1800">
+              <a:rPr lang="en-US" sz="1800" dirty="0">
                 <a:solidFill>
                   <a:schemeClr val="dk1"/>
                 </a:solidFill>
               </a:rPr>
-              <a:t>10,000+ songs will be sourced and processed from Spotify to perform k-means clustering</a:t>
+              <a:t>10,000+ songs collected via Spotify API</a:t>
             </a:r>
-            <a:endParaRPr sz="1800">
+            <a:endParaRPr sz="1800" dirty="0">
               <a:solidFill>
                 <a:schemeClr val="dk1"/>
               </a:solidFill>
@@ -8740,14 +8740,40 @@
               <a:buChar char="●"/>
             </a:pPr>
             <a:r>
-              <a:rPr lang="en-US" sz="1800">
+              <a:rPr lang="en-US" sz="1800" dirty="0">
                 <a:solidFill>
                   <a:schemeClr val="dk1"/>
                 </a:solidFill>
               </a:rPr>
-              <a:t>End product will be able to accept preprocessed song metadata, vectorize, and classify by genre</a:t>
+              <a:t>End product will accept preprocessed song metadata and predict genre</a:t>
             </a:r>
-            <a:endParaRPr sz="1800">
+          </a:p>
+          <a:p>
+            <a:pPr marL="457200" lvl="0" indent="-342900" algn="l" rtl="0">
+              <a:lnSpc>
+                <a:spcPct val="95000"/>
+              </a:lnSpc>
+              <a:spcBef>
+                <a:spcPts val="0"/>
+              </a:spcBef>
+              <a:spcAft>
+                <a:spcPts val="0"/>
+              </a:spcAft>
+              <a:buClr>
+                <a:schemeClr val="dk1"/>
+              </a:buClr>
+              <a:buSzPts val="1800"/>
+              <a:buChar char="●"/>
+            </a:pPr>
+            <a:r>
+              <a:rPr lang="en-US" sz="1800" dirty="0">
+                <a:solidFill>
+                  <a:schemeClr val="dk1"/>
+                </a:solidFill>
+              </a:rPr>
+              <a:t>Can k-means clusters align with genre labels?</a:t>
+            </a:r>
+            <a:endParaRPr sz="1800" dirty="0">
               <a:solidFill>
                 <a:schemeClr val="dk1"/>
               </a:solidFill>
@@ -8766,7 +8792,7 @@
               </a:spcAft>
               <a:buNone/>
             </a:pPr>
-            <a:endParaRPr sz="1800"/>
+            <a:endParaRPr sz="1800" dirty="0"/>
           </a:p>
         </p:txBody>
       </p:sp>
@@ -9531,10 +9557,10 @@
       </p:sp>
       <p:pic>
         <p:nvPicPr>
-          <p:cNvPr id="3" name="Picture 2">
+          <p:cNvPr id="5" name="Picture 4">
             <a:extLst>
               <a:ext uri="{FF2B5EF4-FFF2-40B4-BE49-F238E27FC236}">
-                <a16:creationId xmlns:a16="http://schemas.microsoft.com/office/drawing/2014/main" id="{3F13A1D5-89B9-4810-934A-ACAA57436244}"/>
+                <a16:creationId xmlns:a16="http://schemas.microsoft.com/office/drawing/2014/main" id="{EA8CB3AA-5015-4C5A-9984-9A3017BE6968}"/>
               </a:ext>
             </a:extLst>
           </p:cNvPr>
@@ -9551,8 +9577,8 @@
         </p:blipFill>
         <p:spPr>
           <a:xfrm>
-            <a:off x="787585" y="917830"/>
-            <a:ext cx="7703602" cy="2971695"/>
+            <a:off x="687590" y="809645"/>
+            <a:ext cx="7984053" cy="3079880"/>
           </a:xfrm>
           <a:prstGeom prst="rect">
             <a:avLst/>
@@ -10828,7 +10854,13 @@
         <p:nvGraphicFramePr>
           <p:cNvPr id="134" name="Google Shape;134;p20"/>
           <p:cNvGraphicFramePr/>
-          <p:nvPr/>
+          <p:nvPr>
+            <p:extLst>
+              <p:ext uri="{D42A27DB-BD31-4B8C-83A1-F6EECF244321}">
+                <p14:modId xmlns:p14="http://schemas.microsoft.com/office/powerpoint/2010/main" val="3762976276"/>
+              </p:ext>
+            </p:extLst>
+          </p:nvPr>
         </p:nvGraphicFramePr>
         <p:xfrm>
           <a:off x="195963" y="820067"/>
@@ -10979,10 +11011,10 @@
                         <a:buNone/>
                       </a:pPr>
                       <a:r>
-                        <a:rPr lang="en-US" sz="1100"/>
-                        <a:t>Initial Progress Checkpoint (API keys, sample song metadata json stored in dataproc)</a:t>
+                        <a:rPr lang="en-US" sz="1100" dirty="0"/>
+                        <a:t>Initial Progress Checkpoint (API keys, sample song metadata json stored in GCP)</a:t>
                       </a:r>
-                      <a:endParaRPr sz="1100"/>
+                      <a:endParaRPr sz="1100" dirty="0"/>
                     </a:p>
                   </a:txBody>
                   <a:tcPr marL="91425" marR="91425" marT="91425" marB="91425"/>
@@ -11055,10 +11087,10 @@
                         <a:buNone/>
                       </a:pPr>
                       <a:r>
-                        <a:rPr lang="en-US" sz="1100"/>
+                        <a:rPr lang="en-US" sz="1100" dirty="0"/>
                         <a:t>Progress Presentation</a:t>
                       </a:r>
-                      <a:endParaRPr sz="1100"/>
+                      <a:endParaRPr sz="1100" dirty="0"/>
                     </a:p>
                   </a:txBody>
                   <a:tcPr marL="91425" marR="91425" marT="91425" marB="91425"/>
@@ -11514,10 +11546,10 @@
                         <a:buNone/>
                       </a:pPr>
                       <a:r>
-                        <a:rPr lang="en-US" sz="1100"/>
+                        <a:rPr lang="en-US" sz="1100" dirty="0"/>
                         <a:t>Everyone</a:t>
                       </a:r>
-                      <a:endParaRPr sz="1100"/>
+                      <a:endParaRPr sz="1100" dirty="0"/>
                     </a:p>
                   </a:txBody>
                   <a:tcPr marL="91425" marR="91425" marT="91425" marB="91425"/>

</xml_diff>

<commit_message>
more finishing touches last one
</commit_message>
<xml_diff>
--- a/Documentation/Spotify Classifier Proposal.pptx
+++ b/Documentation/Spotify Classifier Proposal.pptx
@@ -9548,10 +9548,10 @@
               <a:buNone/>
             </a:pPr>
             <a:r>
-              <a:rPr lang="en-US" i="1"/>
-              <a:t>Fig 2. System Diagram</a:t>
+              <a:rPr lang="en-US" i="1" dirty="0"/>
+              <a:t>Fig 3. System Diagram</a:t>
             </a:r>
-            <a:endParaRPr i="1"/>
+            <a:endParaRPr i="1" dirty="0"/>
           </a:p>
         </p:txBody>
       </p:sp>
@@ -10257,10 +10257,10 @@
               <a:buNone/>
             </a:pPr>
             <a:r>
-              <a:rPr lang="en-US" i="1"/>
-              <a:t>Fig 3. Tools (GCP, GitHub, Spark)</a:t>
+              <a:rPr lang="en-US" i="1" dirty="0"/>
+              <a:t>Fig 4. Tools (GCP, GitHub, Spark)</a:t>
             </a:r>
-            <a:endParaRPr i="1"/>
+            <a:endParaRPr i="1" dirty="0"/>
           </a:p>
         </p:txBody>
       </p:sp>
@@ -10682,9 +10682,13 @@
             </a:pPr>
             <a:r>
               <a:rPr lang="en-US" i="1"/>
-              <a:t>Fig 4. Beat Histogram for Classical (Left) and Pop (Right) [1]</a:t>
+              <a:t>Fig 5. </a:t>
             </a:r>
-            <a:endParaRPr i="1"/>
+            <a:r>
+              <a:rPr lang="en-US" i="1" dirty="0"/>
+              <a:t>Beat Histogram for Classical (Left) and Pop (Right) [1]</a:t>
+            </a:r>
+            <a:endParaRPr i="1" dirty="0"/>
           </a:p>
         </p:txBody>
       </p:sp>

</xml_diff>

<commit_message>
Basic commands for querying Spotify API, created developer account for project
</commit_message>
<xml_diff>
--- a/Documentation/Spotify Classifier Proposal.pptx
+++ b/Documentation/Spotify Classifier Proposal.pptx
@@ -10,9 +10,9 @@
   <p:sldIdLst>
     <p:sldId id="256" r:id="rId2"/>
     <p:sldId id="257" r:id="rId3"/>
-    <p:sldId id="258" r:id="rId4"/>
-    <p:sldId id="259" r:id="rId5"/>
-    <p:sldId id="260" r:id="rId6"/>
+    <p:sldId id="260" r:id="rId4"/>
+    <p:sldId id="258" r:id="rId5"/>
+    <p:sldId id="259" r:id="rId6"/>
     <p:sldId id="261" r:id="rId7"/>
     <p:sldId id="262" r:id="rId8"/>
   </p:sldIdLst>
@@ -1709,6 +1709,138 @@
   <p:cSld>
     <p:spTree>
       <p:nvGrpSpPr>
+        <p:cNvPr id="1" name="Shape 102"/>
+        <p:cNvGrpSpPr/>
+        <p:nvPr/>
+      </p:nvGrpSpPr>
+      <p:grpSpPr>
+        <a:xfrm>
+          <a:off x="0" y="0"/>
+          <a:ext cx="0" cy="0"/>
+          <a:chOff x="0" y="0"/>
+          <a:chExt cx="0" cy="0"/>
+        </a:xfrm>
+      </p:grpSpPr>
+      <p:sp>
+        <p:nvSpPr>
+          <p:cNvPr id="103" name="Google Shape;103;gf861cc4a69_0_4:notes"/>
+          <p:cNvSpPr txBox="1">
+            <a:spLocks noGrp="1"/>
+          </p:cNvSpPr>
+          <p:nvPr>
+            <p:ph type="body" idx="1"/>
+          </p:nvPr>
+        </p:nvSpPr>
+        <p:spPr>
+          <a:xfrm>
+            <a:off x="685800" y="4400550"/>
+            <a:ext cx="5486400" cy="3600600"/>
+          </a:xfrm>
+          <a:prstGeom prst="rect">
+            <a:avLst/>
+          </a:prstGeom>
+        </p:spPr>
+        <p:txBody>
+          <a:bodyPr spcFirstLastPara="1" wrap="square" lIns="91425" tIns="45700" rIns="91425" bIns="45700" anchor="t" anchorCtr="0">
+            <a:noAutofit/>
+          </a:bodyPr>
+          <a:lstStyle/>
+          <a:p>
+            <a:pPr marL="0" lvl="0" indent="0" algn="just" rtl="0">
+              <a:lnSpc>
+                <a:spcPct val="95000"/>
+              </a:lnSpc>
+              <a:spcBef>
+                <a:spcPts val="0"/>
+              </a:spcBef>
+              <a:spcAft>
+                <a:spcPts val="0"/>
+              </a:spcAft>
+              <a:buClr>
+                <a:schemeClr val="dk1"/>
+              </a:buClr>
+              <a:buSzPts val="1100"/>
+              <a:buFont typeface="Arial"/>
+              <a:buNone/>
+            </a:pPr>
+            <a:endParaRPr sz="1000">
+              <a:solidFill>
+                <a:schemeClr val="dk1"/>
+              </a:solidFill>
+              <a:latin typeface="Times New Roman"/>
+              <a:ea typeface="Times New Roman"/>
+              <a:cs typeface="Times New Roman"/>
+              <a:sym typeface="Times New Roman"/>
+            </a:endParaRPr>
+          </a:p>
+          <a:p>
+            <a:pPr marL="0" lvl="0" indent="0" algn="l" rtl="0">
+              <a:spcBef>
+                <a:spcPts val="600"/>
+              </a:spcBef>
+              <a:spcAft>
+                <a:spcPts val="0"/>
+              </a:spcAft>
+              <a:buNone/>
+            </a:pPr>
+            <a:endParaRPr/>
+          </a:p>
+        </p:txBody>
+      </p:sp>
+      <p:sp>
+        <p:nvSpPr>
+          <p:cNvPr id="104" name="Google Shape;104;gf861cc4a69_0_4:notes"/>
+          <p:cNvSpPr>
+            <a:spLocks noGrp="1" noRot="1" noChangeAspect="1"/>
+          </p:cNvSpPr>
+          <p:nvPr>
+            <p:ph type="sldImg" idx="2"/>
+          </p:nvPr>
+        </p:nvSpPr>
+        <p:spPr>
+          <a:xfrm>
+            <a:off x="685800" y="1143000"/>
+            <a:ext cx="5486400" cy="3086100"/>
+          </a:xfrm>
+          <a:custGeom>
+            <a:avLst/>
+            <a:gdLst/>
+            <a:ahLst/>
+            <a:cxnLst/>
+            <a:rect l="l" t="t" r="r" b="b"/>
+            <a:pathLst>
+              <a:path w="120000" h="120000" extrusionOk="0">
+                <a:moveTo>
+                  <a:pt x="0" y="0"/>
+                </a:moveTo>
+                <a:lnTo>
+                  <a:pt x="120000" y="0"/>
+                </a:lnTo>
+                <a:lnTo>
+                  <a:pt x="120000" y="120000"/>
+                </a:lnTo>
+                <a:lnTo>
+                  <a:pt x="0" y="120000"/>
+                </a:lnTo>
+                <a:close/>
+              </a:path>
+            </a:pathLst>
+          </a:custGeom>
+        </p:spPr>
+      </p:sp>
+    </p:spTree>
+  </p:cSld>
+  <p:clrMapOvr>
+    <a:masterClrMapping/>
+  </p:clrMapOvr>
+</p:notes>
+</file>
+
+<file path=ppt/notesSlides/notesSlide4.xml><?xml version="1.0" encoding="utf-8"?>
+<p:notes xmlns:a="http://schemas.openxmlformats.org/drawingml/2006/main" xmlns:r="http://schemas.openxmlformats.org/officeDocument/2006/relationships" xmlns:p="http://schemas.openxmlformats.org/presentationml/2006/main" showMasterSp="0" showMasterPhAnim="0">
+  <p:cSld>
+    <p:spTree>
+      <p:nvGrpSpPr>
         <p:cNvPr id="1" name="Shape 81"/>
         <p:cNvGrpSpPr/>
         <p:nvPr/>
@@ -1836,7 +1968,7 @@
 </p:notes>
 </file>
 
-<file path=ppt/notesSlides/notesSlide4.xml><?xml version="1.0" encoding="utf-8"?>
+<file path=ppt/notesSlides/notesSlide5.xml><?xml version="1.0" encoding="utf-8"?>
 <p:notes xmlns:a="http://schemas.openxmlformats.org/drawingml/2006/main" xmlns:r="http://schemas.openxmlformats.org/officeDocument/2006/relationships" xmlns:p="http://schemas.openxmlformats.org/presentationml/2006/main" showMasterSp="0" showMasterPhAnim="0">
   <p:cSld>
     <p:spTree>
@@ -1922,138 +2054,6 @@
       <p:sp>
         <p:nvSpPr>
           <p:cNvPr id="94" name="Google Shape;94;gf861cc4a69_0_14:notes"/>
-          <p:cNvSpPr>
-            <a:spLocks noGrp="1" noRot="1" noChangeAspect="1"/>
-          </p:cNvSpPr>
-          <p:nvPr>
-            <p:ph type="sldImg" idx="2"/>
-          </p:nvPr>
-        </p:nvSpPr>
-        <p:spPr>
-          <a:xfrm>
-            <a:off x="685800" y="1143000"/>
-            <a:ext cx="5486400" cy="3086100"/>
-          </a:xfrm>
-          <a:custGeom>
-            <a:avLst/>
-            <a:gdLst/>
-            <a:ahLst/>
-            <a:cxnLst/>
-            <a:rect l="l" t="t" r="r" b="b"/>
-            <a:pathLst>
-              <a:path w="120000" h="120000" extrusionOk="0">
-                <a:moveTo>
-                  <a:pt x="0" y="0"/>
-                </a:moveTo>
-                <a:lnTo>
-                  <a:pt x="120000" y="0"/>
-                </a:lnTo>
-                <a:lnTo>
-                  <a:pt x="120000" y="120000"/>
-                </a:lnTo>
-                <a:lnTo>
-                  <a:pt x="0" y="120000"/>
-                </a:lnTo>
-                <a:close/>
-              </a:path>
-            </a:pathLst>
-          </a:custGeom>
-        </p:spPr>
-      </p:sp>
-    </p:spTree>
-  </p:cSld>
-  <p:clrMapOvr>
-    <a:masterClrMapping/>
-  </p:clrMapOvr>
-</p:notes>
-</file>
-
-<file path=ppt/notesSlides/notesSlide5.xml><?xml version="1.0" encoding="utf-8"?>
-<p:notes xmlns:a="http://schemas.openxmlformats.org/drawingml/2006/main" xmlns:r="http://schemas.openxmlformats.org/officeDocument/2006/relationships" xmlns:p="http://schemas.openxmlformats.org/presentationml/2006/main" showMasterSp="0" showMasterPhAnim="0">
-  <p:cSld>
-    <p:spTree>
-      <p:nvGrpSpPr>
-        <p:cNvPr id="1" name="Shape 102"/>
-        <p:cNvGrpSpPr/>
-        <p:nvPr/>
-      </p:nvGrpSpPr>
-      <p:grpSpPr>
-        <a:xfrm>
-          <a:off x="0" y="0"/>
-          <a:ext cx="0" cy="0"/>
-          <a:chOff x="0" y="0"/>
-          <a:chExt cx="0" cy="0"/>
-        </a:xfrm>
-      </p:grpSpPr>
-      <p:sp>
-        <p:nvSpPr>
-          <p:cNvPr id="103" name="Google Shape;103;gf861cc4a69_0_4:notes"/>
-          <p:cNvSpPr txBox="1">
-            <a:spLocks noGrp="1"/>
-          </p:cNvSpPr>
-          <p:nvPr>
-            <p:ph type="body" idx="1"/>
-          </p:nvPr>
-        </p:nvSpPr>
-        <p:spPr>
-          <a:xfrm>
-            <a:off x="685800" y="4400550"/>
-            <a:ext cx="5486400" cy="3600600"/>
-          </a:xfrm>
-          <a:prstGeom prst="rect">
-            <a:avLst/>
-          </a:prstGeom>
-        </p:spPr>
-        <p:txBody>
-          <a:bodyPr spcFirstLastPara="1" wrap="square" lIns="91425" tIns="45700" rIns="91425" bIns="45700" anchor="t" anchorCtr="0">
-            <a:noAutofit/>
-          </a:bodyPr>
-          <a:lstStyle/>
-          <a:p>
-            <a:pPr marL="0" lvl="0" indent="0" algn="just" rtl="0">
-              <a:lnSpc>
-                <a:spcPct val="95000"/>
-              </a:lnSpc>
-              <a:spcBef>
-                <a:spcPts val="0"/>
-              </a:spcBef>
-              <a:spcAft>
-                <a:spcPts val="0"/>
-              </a:spcAft>
-              <a:buClr>
-                <a:schemeClr val="dk1"/>
-              </a:buClr>
-              <a:buSzPts val="1100"/>
-              <a:buFont typeface="Arial"/>
-              <a:buNone/>
-            </a:pPr>
-            <a:endParaRPr sz="1000">
-              <a:solidFill>
-                <a:schemeClr val="dk1"/>
-              </a:solidFill>
-              <a:latin typeface="Times New Roman"/>
-              <a:ea typeface="Times New Roman"/>
-              <a:cs typeface="Times New Roman"/>
-              <a:sym typeface="Times New Roman"/>
-            </a:endParaRPr>
-          </a:p>
-          <a:p>
-            <a:pPr marL="0" lvl="0" indent="0" algn="l" rtl="0">
-              <a:spcBef>
-                <a:spcPts val="600"/>
-              </a:spcBef>
-              <a:spcAft>
-                <a:spcPts val="0"/>
-              </a:spcAft>
-              <a:buNone/>
-            </a:pPr>
-            <a:endParaRPr/>
-          </a:p>
-        </p:txBody>
-      </p:sp>
-      <p:sp>
-        <p:nvSpPr>
-          <p:cNvPr id="104" name="Google Shape;104;gf861cc4a69_0_4:notes"/>
           <p:cNvSpPr>
             <a:spLocks noGrp="1" noRot="1" noChangeAspect="1"/>
           </p:cNvSpPr>
@@ -8879,6 +8879,685 @@
   <p:cSld>
     <p:spTree>
       <p:nvGrpSpPr>
+        <p:cNvPr id="1" name="Shape 105"/>
+        <p:cNvGrpSpPr/>
+        <p:nvPr/>
+      </p:nvGrpSpPr>
+      <p:grpSpPr>
+        <a:xfrm>
+          <a:off x="0" y="0"/>
+          <a:ext cx="0" cy="0"/>
+          <a:chOff x="0" y="0"/>
+          <a:chExt cx="0" cy="0"/>
+        </a:xfrm>
+      </p:grpSpPr>
+      <p:grpSp>
+        <p:nvGrpSpPr>
+          <p:cNvPr id="106" name="Google Shape;106;p18"/>
+          <p:cNvGrpSpPr/>
+          <p:nvPr/>
+        </p:nvGrpSpPr>
+        <p:grpSpPr>
+          <a:xfrm>
+            <a:off x="-150" y="4761900"/>
+            <a:ext cx="9144000" cy="381600"/>
+            <a:chOff x="-150" y="4761900"/>
+            <a:chExt cx="9144000" cy="381600"/>
+          </a:xfrm>
+        </p:grpSpPr>
+        <p:sp>
+          <p:nvSpPr>
+            <p:cNvPr id="107" name="Google Shape;107;p18"/>
+            <p:cNvSpPr/>
+            <p:nvPr/>
+          </p:nvSpPr>
+          <p:spPr>
+            <a:xfrm>
+              <a:off x="-150" y="4761900"/>
+              <a:ext cx="9144000" cy="381600"/>
+            </a:xfrm>
+            <a:prstGeom prst="rect">
+              <a:avLst/>
+            </a:prstGeom>
+            <a:solidFill>
+              <a:srgbClr val="002060"/>
+            </a:solidFill>
+            <a:ln>
+              <a:noFill/>
+            </a:ln>
+          </p:spPr>
+          <p:txBody>
+            <a:bodyPr spcFirstLastPara="1" wrap="square" lIns="91425" tIns="91425" rIns="91425" bIns="91425" anchor="ctr" anchorCtr="0">
+              <a:noAutofit/>
+            </a:bodyPr>
+            <a:lstStyle/>
+            <a:p>
+              <a:pPr marL="0" lvl="0" indent="0" algn="l" rtl="0">
+                <a:spcBef>
+                  <a:spcPts val="0"/>
+                </a:spcBef>
+                <a:spcAft>
+                  <a:spcPts val="0"/>
+                </a:spcAft>
+                <a:buNone/>
+              </a:pPr>
+              <a:endParaRPr/>
+            </a:p>
+          </p:txBody>
+        </p:sp>
+        <p:pic>
+          <p:nvPicPr>
+            <p:cNvPr id="108" name="Google Shape;108;p18"/>
+            <p:cNvPicPr preferRelativeResize="0"/>
+            <p:nvPr/>
+          </p:nvPicPr>
+          <p:blipFill>
+            <a:blip r:embed="rId3">
+              <a:alphaModFix/>
+            </a:blip>
+            <a:stretch>
+              <a:fillRect/>
+            </a:stretch>
+          </p:blipFill>
+          <p:spPr>
+            <a:xfrm>
+              <a:off x="84625" y="4830825"/>
+              <a:ext cx="1997205" cy="243750"/>
+            </a:xfrm>
+            <a:prstGeom prst="rect">
+              <a:avLst/>
+            </a:prstGeom>
+            <a:noFill/>
+            <a:ln>
+              <a:noFill/>
+            </a:ln>
+          </p:spPr>
+        </p:pic>
+      </p:grpSp>
+      <p:sp>
+        <p:nvSpPr>
+          <p:cNvPr id="109" name="Google Shape;109;p18"/>
+          <p:cNvSpPr txBox="1">
+            <a:spLocks noGrp="1"/>
+          </p:cNvSpPr>
+          <p:nvPr>
+            <p:ph type="title"/>
+          </p:nvPr>
+        </p:nvSpPr>
+        <p:spPr>
+          <a:xfrm>
+            <a:off x="247675" y="66600"/>
+            <a:ext cx="6272400" cy="692400"/>
+          </a:xfrm>
+          <a:prstGeom prst="rect">
+            <a:avLst/>
+          </a:prstGeom>
+          <a:noFill/>
+          <a:ln>
+            <a:noFill/>
+          </a:ln>
+        </p:spPr>
+        <p:txBody>
+          <a:bodyPr spcFirstLastPara="1" wrap="square" lIns="91425" tIns="45700" rIns="91425" bIns="45700" anchor="b" anchorCtr="0">
+            <a:noAutofit/>
+          </a:bodyPr>
+          <a:lstStyle/>
+          <a:p>
+            <a:pPr marL="0" lvl="0" indent="0" algn="l" rtl="0">
+              <a:lnSpc>
+                <a:spcPct val="100000"/>
+              </a:lnSpc>
+              <a:spcBef>
+                <a:spcPts val="0"/>
+              </a:spcBef>
+              <a:spcAft>
+                <a:spcPts val="0"/>
+              </a:spcAft>
+              <a:buClr>
+                <a:schemeClr val="dk1"/>
+              </a:buClr>
+              <a:buSzPts val="4400"/>
+              <a:buFont typeface="DecoType Naskh"/>
+              <a:buNone/>
+            </a:pPr>
+            <a:r>
+              <a:rPr lang="en-US" sz="3000"/>
+              <a:t>Methods (Tools + Algorithms)</a:t>
+            </a:r>
+            <a:endParaRPr sz="3000"/>
+          </a:p>
+        </p:txBody>
+      </p:sp>
+      <p:sp>
+        <p:nvSpPr>
+          <p:cNvPr id="110" name="Google Shape;110;p18"/>
+          <p:cNvSpPr txBox="1"/>
+          <p:nvPr/>
+        </p:nvSpPr>
+        <p:spPr>
+          <a:xfrm>
+            <a:off x="247675" y="1150125"/>
+            <a:ext cx="5080800" cy="3285600"/>
+          </a:xfrm>
+          <a:prstGeom prst="rect">
+            <a:avLst/>
+          </a:prstGeom>
+          <a:noFill/>
+          <a:ln>
+            <a:noFill/>
+          </a:ln>
+        </p:spPr>
+        <p:txBody>
+          <a:bodyPr spcFirstLastPara="1" wrap="square" lIns="91425" tIns="91425" rIns="91425" bIns="91425" anchor="t" anchorCtr="0">
+            <a:noAutofit/>
+          </a:bodyPr>
+          <a:lstStyle/>
+          <a:p>
+            <a:pPr marL="457200" lvl="0" indent="-317500" algn="l" rtl="0">
+              <a:lnSpc>
+                <a:spcPct val="95000"/>
+              </a:lnSpc>
+              <a:spcBef>
+                <a:spcPts val="0"/>
+              </a:spcBef>
+              <a:spcAft>
+                <a:spcPts val="0"/>
+              </a:spcAft>
+              <a:buClr>
+                <a:schemeClr val="dk1"/>
+              </a:buClr>
+              <a:buSzPts val="1400"/>
+              <a:buChar char="●"/>
+            </a:pPr>
+            <a:r>
+              <a:rPr lang="en-US">
+                <a:solidFill>
+                  <a:schemeClr val="dk1"/>
+                </a:solidFill>
+              </a:rPr>
+              <a:t>Spotify Developer API</a:t>
+            </a:r>
+            <a:endParaRPr>
+              <a:solidFill>
+                <a:schemeClr val="dk1"/>
+              </a:solidFill>
+            </a:endParaRPr>
+          </a:p>
+          <a:p>
+            <a:pPr marL="914400" lvl="1" indent="-317500" algn="l" rtl="0">
+              <a:lnSpc>
+                <a:spcPct val="95000"/>
+              </a:lnSpc>
+              <a:spcBef>
+                <a:spcPts val="0"/>
+              </a:spcBef>
+              <a:spcAft>
+                <a:spcPts val="0"/>
+              </a:spcAft>
+              <a:buClr>
+                <a:schemeClr val="dk1"/>
+              </a:buClr>
+              <a:buSzPts val="1400"/>
+              <a:buChar char="○"/>
+            </a:pPr>
+            <a:r>
+              <a:rPr lang="en-US">
+                <a:solidFill>
+                  <a:schemeClr val="dk1"/>
+                </a:solidFill>
+              </a:rPr>
+              <a:t>Source song metadata / features</a:t>
+            </a:r>
+            <a:endParaRPr>
+              <a:solidFill>
+                <a:schemeClr val="dk1"/>
+              </a:solidFill>
+            </a:endParaRPr>
+          </a:p>
+          <a:p>
+            <a:pPr marL="914400" lvl="1" indent="-317500" algn="l" rtl="0">
+              <a:lnSpc>
+                <a:spcPct val="95000"/>
+              </a:lnSpc>
+              <a:spcBef>
+                <a:spcPts val="0"/>
+              </a:spcBef>
+              <a:spcAft>
+                <a:spcPts val="0"/>
+              </a:spcAft>
+              <a:buClr>
+                <a:schemeClr val="dk1"/>
+              </a:buClr>
+              <a:buSzPts val="1400"/>
+              <a:buChar char="○"/>
+            </a:pPr>
+            <a:r>
+              <a:rPr lang="en-US">
+                <a:solidFill>
+                  <a:schemeClr val="dk1"/>
+                </a:solidFill>
+              </a:rPr>
+              <a:t>Find songs from recommendations by genre</a:t>
+            </a:r>
+            <a:endParaRPr>
+              <a:solidFill>
+                <a:schemeClr val="dk1"/>
+              </a:solidFill>
+            </a:endParaRPr>
+          </a:p>
+          <a:p>
+            <a:pPr marL="457200" lvl="0" indent="-317500" algn="l" rtl="0">
+              <a:lnSpc>
+                <a:spcPct val="95000"/>
+              </a:lnSpc>
+              <a:spcBef>
+                <a:spcPts val="0"/>
+              </a:spcBef>
+              <a:spcAft>
+                <a:spcPts val="0"/>
+              </a:spcAft>
+              <a:buClr>
+                <a:schemeClr val="dk1"/>
+              </a:buClr>
+              <a:buSzPts val="1400"/>
+              <a:buChar char="●"/>
+            </a:pPr>
+            <a:r>
+              <a:rPr lang="en-US">
+                <a:solidFill>
+                  <a:schemeClr val="dk1"/>
+                </a:solidFill>
+              </a:rPr>
+              <a:t>Google Cloud Platform </a:t>
+            </a:r>
+            <a:endParaRPr>
+              <a:solidFill>
+                <a:schemeClr val="dk1"/>
+              </a:solidFill>
+            </a:endParaRPr>
+          </a:p>
+          <a:p>
+            <a:pPr marL="914400" lvl="1" indent="-317500" algn="l" rtl="0">
+              <a:lnSpc>
+                <a:spcPct val="95000"/>
+              </a:lnSpc>
+              <a:spcBef>
+                <a:spcPts val="0"/>
+              </a:spcBef>
+              <a:spcAft>
+                <a:spcPts val="0"/>
+              </a:spcAft>
+              <a:buClr>
+                <a:schemeClr val="dk1"/>
+              </a:buClr>
+              <a:buSzPts val="1400"/>
+              <a:buChar char="○"/>
+            </a:pPr>
+            <a:r>
+              <a:rPr lang="en-US">
+                <a:solidFill>
+                  <a:schemeClr val="dk1"/>
+                </a:solidFill>
+              </a:rPr>
+              <a:t>Run jobs to train model with Dataproc</a:t>
+            </a:r>
+            <a:endParaRPr>
+              <a:solidFill>
+                <a:schemeClr val="dk1"/>
+              </a:solidFill>
+            </a:endParaRPr>
+          </a:p>
+          <a:p>
+            <a:pPr marL="914400" lvl="1" indent="-317500" algn="l" rtl="0">
+              <a:lnSpc>
+                <a:spcPct val="95000"/>
+              </a:lnSpc>
+              <a:spcBef>
+                <a:spcPts val="0"/>
+              </a:spcBef>
+              <a:spcAft>
+                <a:spcPts val="0"/>
+              </a:spcAft>
+              <a:buClr>
+                <a:schemeClr val="dk1"/>
+              </a:buClr>
+              <a:buSzPts val="1400"/>
+              <a:buChar char="○"/>
+            </a:pPr>
+            <a:r>
+              <a:rPr lang="en-US">
+                <a:solidFill>
+                  <a:schemeClr val="dk1"/>
+                </a:solidFill>
+              </a:rPr>
+              <a:t>Store processed song data with BigQuery</a:t>
+            </a:r>
+            <a:endParaRPr>
+              <a:solidFill>
+                <a:schemeClr val="dk1"/>
+              </a:solidFill>
+            </a:endParaRPr>
+          </a:p>
+          <a:p>
+            <a:pPr marL="457200" lvl="0" indent="-317500" algn="l" rtl="0">
+              <a:lnSpc>
+                <a:spcPct val="95000"/>
+              </a:lnSpc>
+              <a:spcBef>
+                <a:spcPts val="0"/>
+              </a:spcBef>
+              <a:spcAft>
+                <a:spcPts val="0"/>
+              </a:spcAft>
+              <a:buClr>
+                <a:schemeClr val="dk1"/>
+              </a:buClr>
+              <a:buSzPts val="1400"/>
+              <a:buChar char="●"/>
+            </a:pPr>
+            <a:r>
+              <a:rPr lang="en-US">
+                <a:solidFill>
+                  <a:schemeClr val="dk1"/>
+                </a:solidFill>
+              </a:rPr>
+              <a:t>Spark ML Library</a:t>
+            </a:r>
+            <a:endParaRPr>
+              <a:solidFill>
+                <a:schemeClr val="dk1"/>
+              </a:solidFill>
+            </a:endParaRPr>
+          </a:p>
+          <a:p>
+            <a:pPr marL="914400" lvl="1" indent="-317500" algn="l" rtl="0">
+              <a:lnSpc>
+                <a:spcPct val="95000"/>
+              </a:lnSpc>
+              <a:spcBef>
+                <a:spcPts val="0"/>
+              </a:spcBef>
+              <a:spcAft>
+                <a:spcPts val="0"/>
+              </a:spcAft>
+              <a:buClr>
+                <a:schemeClr val="dk1"/>
+              </a:buClr>
+              <a:buSzPts val="1400"/>
+              <a:buChar char="○"/>
+            </a:pPr>
+            <a:r>
+              <a:rPr lang="en-US">
+                <a:solidFill>
+                  <a:schemeClr val="dk1"/>
+                </a:solidFill>
+              </a:rPr>
+              <a:t>Use built in spark tools (MapReduce, k-means) for model pipeline</a:t>
+            </a:r>
+            <a:endParaRPr>
+              <a:solidFill>
+                <a:schemeClr val="dk1"/>
+              </a:solidFill>
+            </a:endParaRPr>
+          </a:p>
+          <a:p>
+            <a:pPr marL="457200" lvl="0" indent="-317500" algn="l" rtl="0">
+              <a:lnSpc>
+                <a:spcPct val="95000"/>
+              </a:lnSpc>
+              <a:spcBef>
+                <a:spcPts val="0"/>
+              </a:spcBef>
+              <a:spcAft>
+                <a:spcPts val="0"/>
+              </a:spcAft>
+              <a:buClr>
+                <a:schemeClr val="dk1"/>
+              </a:buClr>
+              <a:buSzPts val="1400"/>
+              <a:buChar char="●"/>
+            </a:pPr>
+            <a:r>
+              <a:rPr lang="en-US">
+                <a:solidFill>
+                  <a:schemeClr val="dk1"/>
+                </a:solidFill>
+              </a:rPr>
+              <a:t>GitHub</a:t>
+            </a:r>
+            <a:endParaRPr>
+              <a:solidFill>
+                <a:schemeClr val="dk1"/>
+              </a:solidFill>
+            </a:endParaRPr>
+          </a:p>
+          <a:p>
+            <a:pPr marL="914400" lvl="1" indent="-317500" algn="l" rtl="0">
+              <a:lnSpc>
+                <a:spcPct val="95000"/>
+              </a:lnSpc>
+              <a:spcBef>
+                <a:spcPts val="0"/>
+              </a:spcBef>
+              <a:spcAft>
+                <a:spcPts val="0"/>
+              </a:spcAft>
+              <a:buClr>
+                <a:schemeClr val="dk1"/>
+              </a:buClr>
+              <a:buSzPts val="1400"/>
+              <a:buChar char="○"/>
+            </a:pPr>
+            <a:r>
+              <a:rPr lang="en-US">
+                <a:solidFill>
+                  <a:schemeClr val="dk1"/>
+                </a:solidFill>
+              </a:rPr>
+              <a:t>Shared repository for collaboration among teammates</a:t>
+            </a:r>
+            <a:endParaRPr>
+              <a:solidFill>
+                <a:schemeClr val="dk1"/>
+              </a:solidFill>
+            </a:endParaRPr>
+          </a:p>
+          <a:p>
+            <a:pPr marL="914400" lvl="1" indent="-317500" algn="l" rtl="0">
+              <a:lnSpc>
+                <a:spcPct val="95000"/>
+              </a:lnSpc>
+              <a:spcBef>
+                <a:spcPts val="0"/>
+              </a:spcBef>
+              <a:spcAft>
+                <a:spcPts val="0"/>
+              </a:spcAft>
+              <a:buClr>
+                <a:schemeClr val="dk1"/>
+              </a:buClr>
+              <a:buSzPts val="1400"/>
+              <a:buChar char="○"/>
+            </a:pPr>
+            <a:r>
+              <a:rPr lang="en-US" u="sng">
+                <a:solidFill>
+                  <a:schemeClr val="hlink"/>
+                </a:solidFill>
+                <a:hlinkClick r:id="rId4"/>
+              </a:rPr>
+              <a:t>https://github.com/athornton1618/SpotifyClassifier</a:t>
+            </a:r>
+            <a:r>
+              <a:rPr lang="en-US">
+                <a:solidFill>
+                  <a:schemeClr val="dk1"/>
+                </a:solidFill>
+              </a:rPr>
+              <a:t> </a:t>
+            </a:r>
+            <a:endParaRPr>
+              <a:solidFill>
+                <a:schemeClr val="dk1"/>
+              </a:solidFill>
+            </a:endParaRPr>
+          </a:p>
+          <a:p>
+            <a:pPr marL="0" lvl="0" indent="0" algn="l" rtl="0">
+              <a:lnSpc>
+                <a:spcPct val="115000"/>
+              </a:lnSpc>
+              <a:spcBef>
+                <a:spcPts val="600"/>
+              </a:spcBef>
+              <a:spcAft>
+                <a:spcPts val="0"/>
+              </a:spcAft>
+              <a:buNone/>
+            </a:pPr>
+            <a:endParaRPr sz="1500"/>
+          </a:p>
+        </p:txBody>
+      </p:sp>
+      <p:pic>
+        <p:nvPicPr>
+          <p:cNvPr id="111" name="Google Shape;111;p18"/>
+          <p:cNvPicPr preferRelativeResize="0"/>
+          <p:nvPr/>
+        </p:nvPicPr>
+        <p:blipFill>
+          <a:blip r:embed="rId5">
+            <a:alphaModFix/>
+          </a:blip>
+          <a:stretch>
+            <a:fillRect/>
+          </a:stretch>
+        </p:blipFill>
+        <p:spPr>
+          <a:xfrm>
+            <a:off x="5517875" y="603575"/>
+            <a:ext cx="3510726" cy="1843131"/>
+          </a:xfrm>
+          <a:prstGeom prst="rect">
+            <a:avLst/>
+          </a:prstGeom>
+          <a:noFill/>
+          <a:ln>
+            <a:noFill/>
+          </a:ln>
+        </p:spPr>
+      </p:pic>
+      <p:pic>
+        <p:nvPicPr>
+          <p:cNvPr id="112" name="Google Shape;112;p18"/>
+          <p:cNvPicPr preferRelativeResize="0"/>
+          <p:nvPr/>
+        </p:nvPicPr>
+        <p:blipFill>
+          <a:blip r:embed="rId6">
+            <a:alphaModFix/>
+          </a:blip>
+          <a:stretch>
+            <a:fillRect/>
+          </a:stretch>
+        </p:blipFill>
+        <p:spPr>
+          <a:xfrm>
+            <a:off x="5670313" y="2310463"/>
+            <a:ext cx="1315876" cy="1315876"/>
+          </a:xfrm>
+          <a:prstGeom prst="rect">
+            <a:avLst/>
+          </a:prstGeom>
+          <a:noFill/>
+          <a:ln>
+            <a:noFill/>
+          </a:ln>
+        </p:spPr>
+      </p:pic>
+      <p:pic>
+        <p:nvPicPr>
+          <p:cNvPr id="113" name="Google Shape;113;p18"/>
+          <p:cNvPicPr preferRelativeResize="0"/>
+          <p:nvPr/>
+        </p:nvPicPr>
+        <p:blipFill>
+          <a:blip r:embed="rId7">
+            <a:alphaModFix/>
+          </a:blip>
+          <a:stretch>
+            <a:fillRect/>
+          </a:stretch>
+        </p:blipFill>
+        <p:spPr>
+          <a:xfrm>
+            <a:off x="7280153" y="2529925"/>
+            <a:ext cx="1689246" cy="877000"/>
+          </a:xfrm>
+          <a:prstGeom prst="rect">
+            <a:avLst/>
+          </a:prstGeom>
+          <a:noFill/>
+          <a:ln>
+            <a:noFill/>
+          </a:ln>
+        </p:spPr>
+      </p:pic>
+      <p:sp>
+        <p:nvSpPr>
+          <p:cNvPr id="114" name="Google Shape;114;p18"/>
+          <p:cNvSpPr txBox="1"/>
+          <p:nvPr/>
+        </p:nvSpPr>
+        <p:spPr>
+          <a:xfrm>
+            <a:off x="5670313" y="3884300"/>
+            <a:ext cx="3303000" cy="400200"/>
+          </a:xfrm>
+          <a:prstGeom prst="rect">
+            <a:avLst/>
+          </a:prstGeom>
+          <a:noFill/>
+          <a:ln>
+            <a:noFill/>
+          </a:ln>
+        </p:spPr>
+        <p:txBody>
+          <a:bodyPr spcFirstLastPara="1" wrap="square" lIns="91425" tIns="91425" rIns="91425" bIns="91425" anchor="t" anchorCtr="0">
+            <a:spAutoFit/>
+          </a:bodyPr>
+          <a:lstStyle/>
+          <a:p>
+            <a:pPr marL="0" lvl="0" indent="0" algn="ctr" rtl="0">
+              <a:spcBef>
+                <a:spcPts val="0"/>
+              </a:spcBef>
+              <a:spcAft>
+                <a:spcPts val="0"/>
+              </a:spcAft>
+              <a:buNone/>
+            </a:pPr>
+            <a:r>
+              <a:rPr lang="en-US" i="1" dirty="0"/>
+              <a:t>Fig 4. Tools (GCP, GitHub, Spark)</a:t>
+            </a:r>
+            <a:endParaRPr i="1" dirty="0"/>
+          </a:p>
+        </p:txBody>
+      </p:sp>
+    </p:spTree>
+  </p:cSld>
+  <p:clrMapOvr>
+    <a:masterClrMapping/>
+  </p:clrMapOvr>
+</p:sld>
+</file>
+
+<file path=ppt/slides/slide4.xml><?xml version="1.0" encoding="utf-8"?>
+<p:sld xmlns:a="http://schemas.openxmlformats.org/drawingml/2006/main" xmlns:r="http://schemas.openxmlformats.org/officeDocument/2006/relationships" xmlns:p="http://schemas.openxmlformats.org/presentationml/2006/main">
+  <p:cSld>
+    <p:spTree>
+      <p:nvGrpSpPr>
         <p:cNvPr id="1" name="Shape 84"/>
         <p:cNvGrpSpPr/>
         <p:nvPr/>
@@ -9359,7 +10038,7 @@
 </p:sld>
 </file>
 
-<file path=ppt/slides/slide4.xml><?xml version="1.0" encoding="utf-8"?>
+<file path=ppt/slides/slide5.xml><?xml version="1.0" encoding="utf-8"?>
 <p:sld xmlns:a="http://schemas.openxmlformats.org/drawingml/2006/main" xmlns:r="http://schemas.openxmlformats.org/officeDocument/2006/relationships" xmlns:p="http://schemas.openxmlformats.org/presentationml/2006/main">
   <p:cSld>
     <p:spTree>
@@ -9585,685 +10264,6 @@
           </a:prstGeom>
         </p:spPr>
       </p:pic>
-    </p:spTree>
-  </p:cSld>
-  <p:clrMapOvr>
-    <a:masterClrMapping/>
-  </p:clrMapOvr>
-</p:sld>
-</file>
-
-<file path=ppt/slides/slide5.xml><?xml version="1.0" encoding="utf-8"?>
-<p:sld xmlns:a="http://schemas.openxmlformats.org/drawingml/2006/main" xmlns:r="http://schemas.openxmlformats.org/officeDocument/2006/relationships" xmlns:p="http://schemas.openxmlformats.org/presentationml/2006/main">
-  <p:cSld>
-    <p:spTree>
-      <p:nvGrpSpPr>
-        <p:cNvPr id="1" name="Shape 105"/>
-        <p:cNvGrpSpPr/>
-        <p:nvPr/>
-      </p:nvGrpSpPr>
-      <p:grpSpPr>
-        <a:xfrm>
-          <a:off x="0" y="0"/>
-          <a:ext cx="0" cy="0"/>
-          <a:chOff x="0" y="0"/>
-          <a:chExt cx="0" cy="0"/>
-        </a:xfrm>
-      </p:grpSpPr>
-      <p:grpSp>
-        <p:nvGrpSpPr>
-          <p:cNvPr id="106" name="Google Shape;106;p18"/>
-          <p:cNvGrpSpPr/>
-          <p:nvPr/>
-        </p:nvGrpSpPr>
-        <p:grpSpPr>
-          <a:xfrm>
-            <a:off x="-150" y="4761900"/>
-            <a:ext cx="9144000" cy="381600"/>
-            <a:chOff x="-150" y="4761900"/>
-            <a:chExt cx="9144000" cy="381600"/>
-          </a:xfrm>
-        </p:grpSpPr>
-        <p:sp>
-          <p:nvSpPr>
-            <p:cNvPr id="107" name="Google Shape;107;p18"/>
-            <p:cNvSpPr/>
-            <p:nvPr/>
-          </p:nvSpPr>
-          <p:spPr>
-            <a:xfrm>
-              <a:off x="-150" y="4761900"/>
-              <a:ext cx="9144000" cy="381600"/>
-            </a:xfrm>
-            <a:prstGeom prst="rect">
-              <a:avLst/>
-            </a:prstGeom>
-            <a:solidFill>
-              <a:srgbClr val="002060"/>
-            </a:solidFill>
-            <a:ln>
-              <a:noFill/>
-            </a:ln>
-          </p:spPr>
-          <p:txBody>
-            <a:bodyPr spcFirstLastPara="1" wrap="square" lIns="91425" tIns="91425" rIns="91425" bIns="91425" anchor="ctr" anchorCtr="0">
-              <a:noAutofit/>
-            </a:bodyPr>
-            <a:lstStyle/>
-            <a:p>
-              <a:pPr marL="0" lvl="0" indent="0" algn="l" rtl="0">
-                <a:spcBef>
-                  <a:spcPts val="0"/>
-                </a:spcBef>
-                <a:spcAft>
-                  <a:spcPts val="0"/>
-                </a:spcAft>
-                <a:buNone/>
-              </a:pPr>
-              <a:endParaRPr/>
-            </a:p>
-          </p:txBody>
-        </p:sp>
-        <p:pic>
-          <p:nvPicPr>
-            <p:cNvPr id="108" name="Google Shape;108;p18"/>
-            <p:cNvPicPr preferRelativeResize="0"/>
-            <p:nvPr/>
-          </p:nvPicPr>
-          <p:blipFill>
-            <a:blip r:embed="rId3">
-              <a:alphaModFix/>
-            </a:blip>
-            <a:stretch>
-              <a:fillRect/>
-            </a:stretch>
-          </p:blipFill>
-          <p:spPr>
-            <a:xfrm>
-              <a:off x="84625" y="4830825"/>
-              <a:ext cx="1997205" cy="243750"/>
-            </a:xfrm>
-            <a:prstGeom prst="rect">
-              <a:avLst/>
-            </a:prstGeom>
-            <a:noFill/>
-            <a:ln>
-              <a:noFill/>
-            </a:ln>
-          </p:spPr>
-        </p:pic>
-      </p:grpSp>
-      <p:sp>
-        <p:nvSpPr>
-          <p:cNvPr id="109" name="Google Shape;109;p18"/>
-          <p:cNvSpPr txBox="1">
-            <a:spLocks noGrp="1"/>
-          </p:cNvSpPr>
-          <p:nvPr>
-            <p:ph type="title"/>
-          </p:nvPr>
-        </p:nvSpPr>
-        <p:spPr>
-          <a:xfrm>
-            <a:off x="247675" y="66600"/>
-            <a:ext cx="6272400" cy="692400"/>
-          </a:xfrm>
-          <a:prstGeom prst="rect">
-            <a:avLst/>
-          </a:prstGeom>
-          <a:noFill/>
-          <a:ln>
-            <a:noFill/>
-          </a:ln>
-        </p:spPr>
-        <p:txBody>
-          <a:bodyPr spcFirstLastPara="1" wrap="square" lIns="91425" tIns="45700" rIns="91425" bIns="45700" anchor="b" anchorCtr="0">
-            <a:noAutofit/>
-          </a:bodyPr>
-          <a:lstStyle/>
-          <a:p>
-            <a:pPr marL="0" lvl="0" indent="0" algn="l" rtl="0">
-              <a:lnSpc>
-                <a:spcPct val="100000"/>
-              </a:lnSpc>
-              <a:spcBef>
-                <a:spcPts val="0"/>
-              </a:spcBef>
-              <a:spcAft>
-                <a:spcPts val="0"/>
-              </a:spcAft>
-              <a:buClr>
-                <a:schemeClr val="dk1"/>
-              </a:buClr>
-              <a:buSzPts val="4400"/>
-              <a:buFont typeface="DecoType Naskh"/>
-              <a:buNone/>
-            </a:pPr>
-            <a:r>
-              <a:rPr lang="en-US" sz="3000"/>
-              <a:t>Methods (Tools + Algorithms)</a:t>
-            </a:r>
-            <a:endParaRPr sz="3000"/>
-          </a:p>
-        </p:txBody>
-      </p:sp>
-      <p:sp>
-        <p:nvSpPr>
-          <p:cNvPr id="110" name="Google Shape;110;p18"/>
-          <p:cNvSpPr txBox="1"/>
-          <p:nvPr/>
-        </p:nvSpPr>
-        <p:spPr>
-          <a:xfrm>
-            <a:off x="247675" y="1150125"/>
-            <a:ext cx="5080800" cy="3285600"/>
-          </a:xfrm>
-          <a:prstGeom prst="rect">
-            <a:avLst/>
-          </a:prstGeom>
-          <a:noFill/>
-          <a:ln>
-            <a:noFill/>
-          </a:ln>
-        </p:spPr>
-        <p:txBody>
-          <a:bodyPr spcFirstLastPara="1" wrap="square" lIns="91425" tIns="91425" rIns="91425" bIns="91425" anchor="t" anchorCtr="0">
-            <a:noAutofit/>
-          </a:bodyPr>
-          <a:lstStyle/>
-          <a:p>
-            <a:pPr marL="457200" lvl="0" indent="-317500" algn="l" rtl="0">
-              <a:lnSpc>
-                <a:spcPct val="95000"/>
-              </a:lnSpc>
-              <a:spcBef>
-                <a:spcPts val="0"/>
-              </a:spcBef>
-              <a:spcAft>
-                <a:spcPts val="0"/>
-              </a:spcAft>
-              <a:buClr>
-                <a:schemeClr val="dk1"/>
-              </a:buClr>
-              <a:buSzPts val="1400"/>
-              <a:buChar char="●"/>
-            </a:pPr>
-            <a:r>
-              <a:rPr lang="en-US">
-                <a:solidFill>
-                  <a:schemeClr val="dk1"/>
-                </a:solidFill>
-              </a:rPr>
-              <a:t>Spotify Developer API</a:t>
-            </a:r>
-            <a:endParaRPr>
-              <a:solidFill>
-                <a:schemeClr val="dk1"/>
-              </a:solidFill>
-            </a:endParaRPr>
-          </a:p>
-          <a:p>
-            <a:pPr marL="914400" lvl="1" indent="-317500" algn="l" rtl="0">
-              <a:lnSpc>
-                <a:spcPct val="95000"/>
-              </a:lnSpc>
-              <a:spcBef>
-                <a:spcPts val="0"/>
-              </a:spcBef>
-              <a:spcAft>
-                <a:spcPts val="0"/>
-              </a:spcAft>
-              <a:buClr>
-                <a:schemeClr val="dk1"/>
-              </a:buClr>
-              <a:buSzPts val="1400"/>
-              <a:buChar char="○"/>
-            </a:pPr>
-            <a:r>
-              <a:rPr lang="en-US">
-                <a:solidFill>
-                  <a:schemeClr val="dk1"/>
-                </a:solidFill>
-              </a:rPr>
-              <a:t>Source song metadata / features</a:t>
-            </a:r>
-            <a:endParaRPr>
-              <a:solidFill>
-                <a:schemeClr val="dk1"/>
-              </a:solidFill>
-            </a:endParaRPr>
-          </a:p>
-          <a:p>
-            <a:pPr marL="914400" lvl="1" indent="-317500" algn="l" rtl="0">
-              <a:lnSpc>
-                <a:spcPct val="95000"/>
-              </a:lnSpc>
-              <a:spcBef>
-                <a:spcPts val="0"/>
-              </a:spcBef>
-              <a:spcAft>
-                <a:spcPts val="0"/>
-              </a:spcAft>
-              <a:buClr>
-                <a:schemeClr val="dk1"/>
-              </a:buClr>
-              <a:buSzPts val="1400"/>
-              <a:buChar char="○"/>
-            </a:pPr>
-            <a:r>
-              <a:rPr lang="en-US">
-                <a:solidFill>
-                  <a:schemeClr val="dk1"/>
-                </a:solidFill>
-              </a:rPr>
-              <a:t>Find songs from recommendations by genre</a:t>
-            </a:r>
-            <a:endParaRPr>
-              <a:solidFill>
-                <a:schemeClr val="dk1"/>
-              </a:solidFill>
-            </a:endParaRPr>
-          </a:p>
-          <a:p>
-            <a:pPr marL="457200" lvl="0" indent="-317500" algn="l" rtl="0">
-              <a:lnSpc>
-                <a:spcPct val="95000"/>
-              </a:lnSpc>
-              <a:spcBef>
-                <a:spcPts val="0"/>
-              </a:spcBef>
-              <a:spcAft>
-                <a:spcPts val="0"/>
-              </a:spcAft>
-              <a:buClr>
-                <a:schemeClr val="dk1"/>
-              </a:buClr>
-              <a:buSzPts val="1400"/>
-              <a:buChar char="●"/>
-            </a:pPr>
-            <a:r>
-              <a:rPr lang="en-US">
-                <a:solidFill>
-                  <a:schemeClr val="dk1"/>
-                </a:solidFill>
-              </a:rPr>
-              <a:t>Google Cloud Platform </a:t>
-            </a:r>
-            <a:endParaRPr>
-              <a:solidFill>
-                <a:schemeClr val="dk1"/>
-              </a:solidFill>
-            </a:endParaRPr>
-          </a:p>
-          <a:p>
-            <a:pPr marL="914400" lvl="1" indent="-317500" algn="l" rtl="0">
-              <a:lnSpc>
-                <a:spcPct val="95000"/>
-              </a:lnSpc>
-              <a:spcBef>
-                <a:spcPts val="0"/>
-              </a:spcBef>
-              <a:spcAft>
-                <a:spcPts val="0"/>
-              </a:spcAft>
-              <a:buClr>
-                <a:schemeClr val="dk1"/>
-              </a:buClr>
-              <a:buSzPts val="1400"/>
-              <a:buChar char="○"/>
-            </a:pPr>
-            <a:r>
-              <a:rPr lang="en-US">
-                <a:solidFill>
-                  <a:schemeClr val="dk1"/>
-                </a:solidFill>
-              </a:rPr>
-              <a:t>Run jobs to train model with Dataproc</a:t>
-            </a:r>
-            <a:endParaRPr>
-              <a:solidFill>
-                <a:schemeClr val="dk1"/>
-              </a:solidFill>
-            </a:endParaRPr>
-          </a:p>
-          <a:p>
-            <a:pPr marL="914400" lvl="1" indent="-317500" algn="l" rtl="0">
-              <a:lnSpc>
-                <a:spcPct val="95000"/>
-              </a:lnSpc>
-              <a:spcBef>
-                <a:spcPts val="0"/>
-              </a:spcBef>
-              <a:spcAft>
-                <a:spcPts val="0"/>
-              </a:spcAft>
-              <a:buClr>
-                <a:schemeClr val="dk1"/>
-              </a:buClr>
-              <a:buSzPts val="1400"/>
-              <a:buChar char="○"/>
-            </a:pPr>
-            <a:r>
-              <a:rPr lang="en-US">
-                <a:solidFill>
-                  <a:schemeClr val="dk1"/>
-                </a:solidFill>
-              </a:rPr>
-              <a:t>Store processed song data with BigQuery</a:t>
-            </a:r>
-            <a:endParaRPr>
-              <a:solidFill>
-                <a:schemeClr val="dk1"/>
-              </a:solidFill>
-            </a:endParaRPr>
-          </a:p>
-          <a:p>
-            <a:pPr marL="457200" lvl="0" indent="-317500" algn="l" rtl="0">
-              <a:lnSpc>
-                <a:spcPct val="95000"/>
-              </a:lnSpc>
-              <a:spcBef>
-                <a:spcPts val="0"/>
-              </a:spcBef>
-              <a:spcAft>
-                <a:spcPts val="0"/>
-              </a:spcAft>
-              <a:buClr>
-                <a:schemeClr val="dk1"/>
-              </a:buClr>
-              <a:buSzPts val="1400"/>
-              <a:buChar char="●"/>
-            </a:pPr>
-            <a:r>
-              <a:rPr lang="en-US">
-                <a:solidFill>
-                  <a:schemeClr val="dk1"/>
-                </a:solidFill>
-              </a:rPr>
-              <a:t>Spark ML Library</a:t>
-            </a:r>
-            <a:endParaRPr>
-              <a:solidFill>
-                <a:schemeClr val="dk1"/>
-              </a:solidFill>
-            </a:endParaRPr>
-          </a:p>
-          <a:p>
-            <a:pPr marL="914400" lvl="1" indent="-317500" algn="l" rtl="0">
-              <a:lnSpc>
-                <a:spcPct val="95000"/>
-              </a:lnSpc>
-              <a:spcBef>
-                <a:spcPts val="0"/>
-              </a:spcBef>
-              <a:spcAft>
-                <a:spcPts val="0"/>
-              </a:spcAft>
-              <a:buClr>
-                <a:schemeClr val="dk1"/>
-              </a:buClr>
-              <a:buSzPts val="1400"/>
-              <a:buChar char="○"/>
-            </a:pPr>
-            <a:r>
-              <a:rPr lang="en-US">
-                <a:solidFill>
-                  <a:schemeClr val="dk1"/>
-                </a:solidFill>
-              </a:rPr>
-              <a:t>Use built in spark tools (MapReduce, k-means) for model pipeline</a:t>
-            </a:r>
-            <a:endParaRPr>
-              <a:solidFill>
-                <a:schemeClr val="dk1"/>
-              </a:solidFill>
-            </a:endParaRPr>
-          </a:p>
-          <a:p>
-            <a:pPr marL="457200" lvl="0" indent="-317500" algn="l" rtl="0">
-              <a:lnSpc>
-                <a:spcPct val="95000"/>
-              </a:lnSpc>
-              <a:spcBef>
-                <a:spcPts val="0"/>
-              </a:spcBef>
-              <a:spcAft>
-                <a:spcPts val="0"/>
-              </a:spcAft>
-              <a:buClr>
-                <a:schemeClr val="dk1"/>
-              </a:buClr>
-              <a:buSzPts val="1400"/>
-              <a:buChar char="●"/>
-            </a:pPr>
-            <a:r>
-              <a:rPr lang="en-US">
-                <a:solidFill>
-                  <a:schemeClr val="dk1"/>
-                </a:solidFill>
-              </a:rPr>
-              <a:t>GitHub</a:t>
-            </a:r>
-            <a:endParaRPr>
-              <a:solidFill>
-                <a:schemeClr val="dk1"/>
-              </a:solidFill>
-            </a:endParaRPr>
-          </a:p>
-          <a:p>
-            <a:pPr marL="914400" lvl="1" indent="-317500" algn="l" rtl="0">
-              <a:lnSpc>
-                <a:spcPct val="95000"/>
-              </a:lnSpc>
-              <a:spcBef>
-                <a:spcPts val="0"/>
-              </a:spcBef>
-              <a:spcAft>
-                <a:spcPts val="0"/>
-              </a:spcAft>
-              <a:buClr>
-                <a:schemeClr val="dk1"/>
-              </a:buClr>
-              <a:buSzPts val="1400"/>
-              <a:buChar char="○"/>
-            </a:pPr>
-            <a:r>
-              <a:rPr lang="en-US">
-                <a:solidFill>
-                  <a:schemeClr val="dk1"/>
-                </a:solidFill>
-              </a:rPr>
-              <a:t>Shared repository for collaboration among teammates</a:t>
-            </a:r>
-            <a:endParaRPr>
-              <a:solidFill>
-                <a:schemeClr val="dk1"/>
-              </a:solidFill>
-            </a:endParaRPr>
-          </a:p>
-          <a:p>
-            <a:pPr marL="914400" lvl="1" indent="-317500" algn="l" rtl="0">
-              <a:lnSpc>
-                <a:spcPct val="95000"/>
-              </a:lnSpc>
-              <a:spcBef>
-                <a:spcPts val="0"/>
-              </a:spcBef>
-              <a:spcAft>
-                <a:spcPts val="0"/>
-              </a:spcAft>
-              <a:buClr>
-                <a:schemeClr val="dk1"/>
-              </a:buClr>
-              <a:buSzPts val="1400"/>
-              <a:buChar char="○"/>
-            </a:pPr>
-            <a:r>
-              <a:rPr lang="en-US" u="sng">
-                <a:solidFill>
-                  <a:schemeClr val="hlink"/>
-                </a:solidFill>
-                <a:hlinkClick r:id="rId4"/>
-              </a:rPr>
-              <a:t>https://github.com/athornton1618/SpotifyClassifier</a:t>
-            </a:r>
-            <a:r>
-              <a:rPr lang="en-US">
-                <a:solidFill>
-                  <a:schemeClr val="dk1"/>
-                </a:solidFill>
-              </a:rPr>
-              <a:t> </a:t>
-            </a:r>
-            <a:endParaRPr>
-              <a:solidFill>
-                <a:schemeClr val="dk1"/>
-              </a:solidFill>
-            </a:endParaRPr>
-          </a:p>
-          <a:p>
-            <a:pPr marL="0" lvl="0" indent="0" algn="l" rtl="0">
-              <a:lnSpc>
-                <a:spcPct val="115000"/>
-              </a:lnSpc>
-              <a:spcBef>
-                <a:spcPts val="600"/>
-              </a:spcBef>
-              <a:spcAft>
-                <a:spcPts val="0"/>
-              </a:spcAft>
-              <a:buNone/>
-            </a:pPr>
-            <a:endParaRPr sz="1500"/>
-          </a:p>
-        </p:txBody>
-      </p:sp>
-      <p:pic>
-        <p:nvPicPr>
-          <p:cNvPr id="111" name="Google Shape;111;p18"/>
-          <p:cNvPicPr preferRelativeResize="0"/>
-          <p:nvPr/>
-        </p:nvPicPr>
-        <p:blipFill>
-          <a:blip r:embed="rId5">
-            <a:alphaModFix/>
-          </a:blip>
-          <a:stretch>
-            <a:fillRect/>
-          </a:stretch>
-        </p:blipFill>
-        <p:spPr>
-          <a:xfrm>
-            <a:off x="5517875" y="603575"/>
-            <a:ext cx="3510726" cy="1843131"/>
-          </a:xfrm>
-          <a:prstGeom prst="rect">
-            <a:avLst/>
-          </a:prstGeom>
-          <a:noFill/>
-          <a:ln>
-            <a:noFill/>
-          </a:ln>
-        </p:spPr>
-      </p:pic>
-      <p:pic>
-        <p:nvPicPr>
-          <p:cNvPr id="112" name="Google Shape;112;p18"/>
-          <p:cNvPicPr preferRelativeResize="0"/>
-          <p:nvPr/>
-        </p:nvPicPr>
-        <p:blipFill>
-          <a:blip r:embed="rId6">
-            <a:alphaModFix/>
-          </a:blip>
-          <a:stretch>
-            <a:fillRect/>
-          </a:stretch>
-        </p:blipFill>
-        <p:spPr>
-          <a:xfrm>
-            <a:off x="5670313" y="2310463"/>
-            <a:ext cx="1315876" cy="1315876"/>
-          </a:xfrm>
-          <a:prstGeom prst="rect">
-            <a:avLst/>
-          </a:prstGeom>
-          <a:noFill/>
-          <a:ln>
-            <a:noFill/>
-          </a:ln>
-        </p:spPr>
-      </p:pic>
-      <p:pic>
-        <p:nvPicPr>
-          <p:cNvPr id="113" name="Google Shape;113;p18"/>
-          <p:cNvPicPr preferRelativeResize="0"/>
-          <p:nvPr/>
-        </p:nvPicPr>
-        <p:blipFill>
-          <a:blip r:embed="rId7">
-            <a:alphaModFix/>
-          </a:blip>
-          <a:stretch>
-            <a:fillRect/>
-          </a:stretch>
-        </p:blipFill>
-        <p:spPr>
-          <a:xfrm>
-            <a:off x="7280153" y="2529925"/>
-            <a:ext cx="1689246" cy="877000"/>
-          </a:xfrm>
-          <a:prstGeom prst="rect">
-            <a:avLst/>
-          </a:prstGeom>
-          <a:noFill/>
-          <a:ln>
-            <a:noFill/>
-          </a:ln>
-        </p:spPr>
-      </p:pic>
-      <p:sp>
-        <p:nvSpPr>
-          <p:cNvPr id="114" name="Google Shape;114;p18"/>
-          <p:cNvSpPr txBox="1"/>
-          <p:nvPr/>
-        </p:nvSpPr>
-        <p:spPr>
-          <a:xfrm>
-            <a:off x="5670313" y="3884300"/>
-            <a:ext cx="3303000" cy="400200"/>
-          </a:xfrm>
-          <a:prstGeom prst="rect">
-            <a:avLst/>
-          </a:prstGeom>
-          <a:noFill/>
-          <a:ln>
-            <a:noFill/>
-          </a:ln>
-        </p:spPr>
-        <p:txBody>
-          <a:bodyPr spcFirstLastPara="1" wrap="square" lIns="91425" tIns="91425" rIns="91425" bIns="91425" anchor="t" anchorCtr="0">
-            <a:spAutoFit/>
-          </a:bodyPr>
-          <a:lstStyle/>
-          <a:p>
-            <a:pPr marL="0" lvl="0" indent="0" algn="ctr" rtl="0">
-              <a:spcBef>
-                <a:spcPts val="0"/>
-              </a:spcBef>
-              <a:spcAft>
-                <a:spcPts val="0"/>
-              </a:spcAft>
-              <a:buNone/>
-            </a:pPr>
-            <a:r>
-              <a:rPr lang="en-US" i="1" dirty="0"/>
-              <a:t>Fig 4. Tools (GCP, GitHub, Spark)</a:t>
-            </a:r>
-            <a:endParaRPr i="1" dirty="0"/>
-          </a:p>
-        </p:txBody>
-      </p:sp>
     </p:spTree>
   </p:cSld>
   <p:clrMapOvr>
@@ -10681,12 +10681,8 @@
               <a:buNone/>
             </a:pPr>
             <a:r>
-              <a:rPr lang="en-US" i="1"/>
-              <a:t>Fig 5. </a:t>
-            </a:r>
-            <a:r>
               <a:rPr lang="en-US" i="1" dirty="0"/>
-              <a:t>Beat Histogram for Classical (Left) and Pop (Right) [1]</a:t>
+              <a:t>Fig 5. Beat Histogram for Classical (Left) and Pop (Right) [1]</a:t>
             </a:r>
             <a:endParaRPr i="1" dirty="0"/>
           </a:p>
@@ -11167,10 +11163,10 @@
                         <a:buNone/>
                       </a:pPr>
                       <a:r>
-                        <a:rPr lang="en-US" sz="1100"/>
+                        <a:rPr lang="en-US" sz="1100" dirty="0"/>
                         <a:t>Minimum Viable Product (product owners listed)</a:t>
                       </a:r>
-                      <a:endParaRPr sz="1100"/>
+                      <a:endParaRPr sz="1100" dirty="0"/>
                     </a:p>
                     <a:p>
                       <a:pPr marL="457200" lvl="0" indent="-298450" algn="l" rtl="0">
@@ -11184,10 +11180,10 @@
                         <a:buAutoNum type="arabicPeriod"/>
                       </a:pPr>
                       <a:r>
-                        <a:rPr lang="en-US" sz="1100"/>
+                        <a:rPr lang="en-US" sz="1100" dirty="0"/>
                         <a:t>Data collection</a:t>
                       </a:r>
-                      <a:endParaRPr sz="1100"/>
+                      <a:endParaRPr sz="1100" dirty="0"/>
                     </a:p>
                     <a:p>
                       <a:pPr marL="457200" lvl="0" indent="-298450" algn="l" rtl="0">
@@ -11201,10 +11197,10 @@
                         <a:buAutoNum type="arabicPeriod"/>
                       </a:pPr>
                       <a:r>
-                        <a:rPr lang="en-US" sz="1100"/>
+                        <a:rPr lang="en-US" sz="1100" dirty="0"/>
                         <a:t>Song vectorization + processing</a:t>
                       </a:r>
-                      <a:endParaRPr sz="1100"/>
+                      <a:endParaRPr sz="1100" dirty="0"/>
                     </a:p>
                     <a:p>
                       <a:pPr marL="457200" lvl="0" indent="-298450" algn="l" rtl="0">
@@ -11218,10 +11214,10 @@
                         <a:buAutoNum type="arabicPeriod"/>
                       </a:pPr>
                       <a:r>
-                        <a:rPr lang="en-US" sz="1100"/>
+                        <a:rPr lang="en-US" sz="1100" dirty="0"/>
                         <a:t>K-means model</a:t>
                       </a:r>
-                      <a:endParaRPr sz="1100"/>
+                      <a:endParaRPr sz="1100" dirty="0"/>
                     </a:p>
                     <a:p>
                       <a:pPr marL="457200" lvl="0" indent="-298450" algn="l" rtl="0">
@@ -11235,10 +11231,10 @@
                         <a:buAutoNum type="arabicPeriod"/>
                       </a:pPr>
                       <a:r>
-                        <a:rPr lang="en-US" sz="1100"/>
+                        <a:rPr lang="en-US" sz="1100" dirty="0"/>
                         <a:t>Analysis + Visualization</a:t>
                       </a:r>
-                      <a:endParaRPr sz="1100"/>
+                      <a:endParaRPr sz="1100" dirty="0"/>
                     </a:p>
                   </a:txBody>
                   <a:tcPr marL="91425" marR="91425" marT="91425" marB="91425"/>

</xml_diff>